<commit_message>
Updated poster to include UKAEA logo
</commit_message>
<xml_diff>
--- a/IAEA_poster.pptx
+++ b/IAEA_poster.pptx
@@ -114,6 +114,91 @@
 </p:presentation>
 </file>
 
+<file path=ppt/revisionInfo.xml><?xml version="1.0" encoding="utf-8"?>
+<p1510:revInfo xmlns:a="http://schemas.openxmlformats.org/drawingml/2006/main" xmlns:r="http://schemas.openxmlformats.org/officeDocument/2006/relationships" xmlns:p1510="http://schemas.microsoft.com/office/powerpoint/2015/10/main">
+  <p1510:revLst>
+    <p1510:client id="{6604DB85-465C-4B22-A286-21CD5F49ECB3}" v="58" dt="2023-09-05T10:45:00.514"/>
+  </p1510:revLst>
+</p1510:revInfo>
+</file>
+
+<file path=ppt/changesInfos/changesInfo1.xml><?xml version="1.0" encoding="utf-8"?>
+<pc:chgInfo xmlns:a="http://schemas.openxmlformats.org/drawingml/2006/main" xmlns:r="http://schemas.openxmlformats.org/officeDocument/2006/relationships" xmlns:ac="http://schemas.microsoft.com/office/drawing/2013/main/command" xmlns:pc="http://schemas.microsoft.com/office/powerpoint/2013/main/command">
+  <pc:docChgLst>
+    <pc:chgData name="Prokopyszyn, Alex" userId="4005ad8b-e7e9-405c-9b46-a44bb2807aac" providerId="ADAL" clId="{6604DB85-465C-4B22-A286-21CD5F49ECB3}"/>
+    <pc:docChg chg="undo custSel modSld">
+      <pc:chgData name="Prokopyszyn, Alex" userId="4005ad8b-e7e9-405c-9b46-a44bb2807aac" providerId="ADAL" clId="{6604DB85-465C-4B22-A286-21CD5F49ECB3}" dt="2023-09-05T10:45:00.513" v="93" actId="14100"/>
+      <pc:docMkLst>
+        <pc:docMk/>
+      </pc:docMkLst>
+      <pc:sldChg chg="addSp delSp modSp mod">
+        <pc:chgData name="Prokopyszyn, Alex" userId="4005ad8b-e7e9-405c-9b46-a44bb2807aac" providerId="ADAL" clId="{6604DB85-465C-4B22-A286-21CD5F49ECB3}" dt="2023-09-05T10:45:00.513" v="93" actId="14100"/>
+        <pc:sldMkLst>
+          <pc:docMk/>
+          <pc:sldMk cId="3331785364" sldId="256"/>
+        </pc:sldMkLst>
+        <pc:spChg chg="mod ord">
+          <ac:chgData name="Prokopyszyn, Alex" userId="4005ad8b-e7e9-405c-9b46-a44bb2807aac" providerId="ADAL" clId="{6604DB85-465C-4B22-A286-21CD5F49ECB3}" dt="2023-09-05T10:44:49.515" v="92" actId="20577"/>
+          <ac:spMkLst>
+            <pc:docMk/>
+            <pc:sldMk cId="3331785364" sldId="256"/>
+            <ac:spMk id="6" creationId="{00000000-0000-0000-0000-000000000000}"/>
+          </ac:spMkLst>
+        </pc:spChg>
+        <pc:spChg chg="add del mod">
+          <ac:chgData name="Prokopyszyn, Alex" userId="4005ad8b-e7e9-405c-9b46-a44bb2807aac" providerId="ADAL" clId="{6604DB85-465C-4B22-A286-21CD5F49ECB3}" dt="2023-09-05T10:41:06.196" v="66" actId="478"/>
+          <ac:spMkLst>
+            <pc:docMk/>
+            <pc:sldMk cId="3331785364" sldId="256"/>
+            <ac:spMk id="8" creationId="{DCC87D43-F7F4-3226-ED2F-8D423F754789}"/>
+          </ac:spMkLst>
+        </pc:spChg>
+        <pc:graphicFrameChg chg="add del mod">
+          <ac:chgData name="Prokopyszyn, Alex" userId="4005ad8b-e7e9-405c-9b46-a44bb2807aac" providerId="ADAL" clId="{6604DB85-465C-4B22-A286-21CD5F49ECB3}" dt="2023-09-05T10:39:35.292" v="57" actId="478"/>
+          <ac:graphicFrameMkLst>
+            <pc:docMk/>
+            <pc:sldMk cId="3331785364" sldId="256"/>
+            <ac:graphicFrameMk id="5" creationId="{1751B5AE-8350-1D11-077B-401610C852E3}"/>
+          </ac:graphicFrameMkLst>
+        </pc:graphicFrameChg>
+        <pc:picChg chg="add del mod modCrop">
+          <ac:chgData name="Prokopyszyn, Alex" userId="4005ad8b-e7e9-405c-9b46-a44bb2807aac" providerId="ADAL" clId="{6604DB85-465C-4B22-A286-21CD5F49ECB3}" dt="2023-09-05T10:41:17.879" v="69" actId="478"/>
+          <ac:picMkLst>
+            <pc:docMk/>
+            <pc:sldMk cId="3331785364" sldId="256"/>
+            <ac:picMk id="4" creationId="{351E97CB-8841-757F-0BC4-951A68932DD0}"/>
+          </ac:picMkLst>
+        </pc:picChg>
+        <pc:picChg chg="add del mod">
+          <ac:chgData name="Prokopyszyn, Alex" userId="4005ad8b-e7e9-405c-9b46-a44bb2807aac" providerId="ADAL" clId="{6604DB85-465C-4B22-A286-21CD5F49ECB3}" dt="2023-09-05T10:40:59.877" v="62" actId="478"/>
+          <ac:picMkLst>
+            <pc:docMk/>
+            <pc:sldMk cId="3331785364" sldId="256"/>
+            <ac:picMk id="7" creationId="{5347AD26-468A-1B4D-C98A-7DB4781AB9CD}"/>
+          </ac:picMkLst>
+        </pc:picChg>
+        <pc:picChg chg="add del mod">
+          <ac:chgData name="Prokopyszyn, Alex" userId="4005ad8b-e7e9-405c-9b46-a44bb2807aac" providerId="ADAL" clId="{6604DB85-465C-4B22-A286-21CD5F49ECB3}" dt="2023-09-05T10:41:06.196" v="66" actId="478"/>
+          <ac:picMkLst>
+            <pc:docMk/>
+            <pc:sldMk cId="3331785364" sldId="256"/>
+            <ac:picMk id="9" creationId="{5450785D-C7E8-648B-8371-AF519480805F}"/>
+          </ac:picMkLst>
+        </pc:picChg>
+        <pc:picChg chg="add mod">
+          <ac:chgData name="Prokopyszyn, Alex" userId="4005ad8b-e7e9-405c-9b46-a44bb2807aac" providerId="ADAL" clId="{6604DB85-465C-4B22-A286-21CD5F49ECB3}" dt="2023-09-05T10:45:00.513" v="93" actId="14100"/>
+          <ac:picMkLst>
+            <pc:docMk/>
+            <pc:sldMk cId="3331785364" sldId="256"/>
+            <ac:picMk id="10" creationId="{799C8AE4-D3D3-D8F6-07CE-571BA578C9E9}"/>
+          </ac:picMkLst>
+        </pc:picChg>
+      </pc:sldChg>
+    </pc:docChg>
+  </pc:docChgLst>
+</pc:chgInfo>
+</file>
+
 <file path=ppt/slideLayouts/slideLayout1.xml><?xml version="1.0" encoding="utf-8"?>
 <p:sldLayout xmlns:a="http://schemas.openxmlformats.org/drawingml/2006/main" xmlns:r="http://schemas.openxmlformats.org/officeDocument/2006/relationships" xmlns:p="http://schemas.openxmlformats.org/presentationml/2006/main" type="title" preserve="1">
   <p:cSld name="Title Slide">
@@ -245,7 +330,7 @@
           <a:p>
             <a:fld id="{D6CCE9EA-F87E-449B-A760-0CFB0069B4F4}" type="datetimeFigureOut">
               <a:rPr lang="en-US" smtClean="0"/>
-              <a:t>8/22/2023</a:t>
+              <a:t>9/5/2023</a:t>
             </a:fld>
             <a:endParaRPr lang="en-US"/>
           </a:p>
@@ -415,7 +500,7 @@
           <a:p>
             <a:fld id="{D6CCE9EA-F87E-449B-A760-0CFB0069B4F4}" type="datetimeFigureOut">
               <a:rPr lang="en-US" smtClean="0"/>
-              <a:t>8/22/2023</a:t>
+              <a:t>9/5/2023</a:t>
             </a:fld>
             <a:endParaRPr lang="en-US"/>
           </a:p>
@@ -595,7 +680,7 @@
           <a:p>
             <a:fld id="{D6CCE9EA-F87E-449B-A760-0CFB0069B4F4}" type="datetimeFigureOut">
               <a:rPr lang="en-US" smtClean="0"/>
-              <a:t>8/22/2023</a:t>
+              <a:t>9/5/2023</a:t>
             </a:fld>
             <a:endParaRPr lang="en-US"/>
           </a:p>
@@ -765,7 +850,7 @@
           <a:p>
             <a:fld id="{D6CCE9EA-F87E-449B-A760-0CFB0069B4F4}" type="datetimeFigureOut">
               <a:rPr lang="en-US" smtClean="0"/>
-              <a:t>8/22/2023</a:t>
+              <a:t>9/5/2023</a:t>
             </a:fld>
             <a:endParaRPr lang="en-US"/>
           </a:p>
@@ -1009,7 +1094,7 @@
           <a:p>
             <a:fld id="{D6CCE9EA-F87E-449B-A760-0CFB0069B4F4}" type="datetimeFigureOut">
               <a:rPr lang="en-US" smtClean="0"/>
-              <a:t>8/22/2023</a:t>
+              <a:t>9/5/2023</a:t>
             </a:fld>
             <a:endParaRPr lang="en-US"/>
           </a:p>
@@ -1241,7 +1326,7 @@
           <a:p>
             <a:fld id="{D6CCE9EA-F87E-449B-A760-0CFB0069B4F4}" type="datetimeFigureOut">
               <a:rPr lang="en-US" smtClean="0"/>
-              <a:t>8/22/2023</a:t>
+              <a:t>9/5/2023</a:t>
             </a:fld>
             <a:endParaRPr lang="en-US"/>
           </a:p>
@@ -1608,7 +1693,7 @@
           <a:p>
             <a:fld id="{D6CCE9EA-F87E-449B-A760-0CFB0069B4F4}" type="datetimeFigureOut">
               <a:rPr lang="en-US" smtClean="0"/>
-              <a:t>8/22/2023</a:t>
+              <a:t>9/5/2023</a:t>
             </a:fld>
             <a:endParaRPr lang="en-US"/>
           </a:p>
@@ -1726,7 +1811,7 @@
           <a:p>
             <a:fld id="{D6CCE9EA-F87E-449B-A760-0CFB0069B4F4}" type="datetimeFigureOut">
               <a:rPr lang="en-US" smtClean="0"/>
-              <a:t>8/22/2023</a:t>
+              <a:t>9/5/2023</a:t>
             </a:fld>
             <a:endParaRPr lang="en-US"/>
           </a:p>
@@ -1821,7 +1906,7 @@
           <a:p>
             <a:fld id="{D6CCE9EA-F87E-449B-A760-0CFB0069B4F4}" type="datetimeFigureOut">
               <a:rPr lang="en-US" smtClean="0"/>
-              <a:t>8/22/2023</a:t>
+              <a:t>9/5/2023</a:t>
             </a:fld>
             <a:endParaRPr lang="en-US"/>
           </a:p>
@@ -2098,7 +2183,7 @@
           <a:p>
             <a:fld id="{D6CCE9EA-F87E-449B-A760-0CFB0069B4F4}" type="datetimeFigureOut">
               <a:rPr lang="en-US" smtClean="0"/>
-              <a:t>8/22/2023</a:t>
+              <a:t>9/5/2023</a:t>
             </a:fld>
             <a:endParaRPr lang="en-US"/>
           </a:p>
@@ -2355,7 +2440,7 @@
           <a:p>
             <a:fld id="{D6CCE9EA-F87E-449B-A760-0CFB0069B4F4}" type="datetimeFigureOut">
               <a:rPr lang="en-US" smtClean="0"/>
-              <a:t>8/22/2023</a:t>
+              <a:t>9/5/2023</a:t>
             </a:fld>
             <a:endParaRPr lang="en-US"/>
           </a:p>
@@ -2568,7 +2653,7 @@
           <a:p>
             <a:fld id="{D6CCE9EA-F87E-449B-A760-0CFB0069B4F4}" type="datetimeFigureOut">
               <a:rPr lang="en-US" smtClean="0"/>
-              <a:t>8/22/2023</a:t>
+              <a:t>9/5/2023</a:t>
             </a:fld>
             <a:endParaRPr lang="en-US"/>
           </a:p>
@@ -3005,7 +3090,6 @@
           </a:bodyPr>
           <a:lstStyle/>
           <a:p>
-            <a:pPr algn="ctr"/>
             <a:r>
               <a:rPr lang="en-US" sz="9600" b="1" kern="0" spc="-100" dirty="0">
                 <a:solidFill>
@@ -3044,7 +3128,7 @@
                   <a:schemeClr val="bg1"/>
                 </a:solidFill>
               </a:rPr>
-              <a:t>ѐ</a:t>
+              <a:t>é</a:t>
             </a:r>
             <a:r>
               <a:rPr lang="en-GB" sz="9600" b="1" kern="0" spc="-100" dirty="0">
@@ -3056,7 +3140,6 @@
             </a:r>
           </a:p>
           <a:p>
-            <a:pPr algn="ctr"/>
             <a:r>
               <a:rPr lang="en-US" sz="9600" b="1" kern="0" spc="-100" dirty="0">
                 <a:solidFill>
@@ -3067,7 +3150,6 @@
             </a:r>
           </a:p>
           <a:p>
-            <a:pPr algn="ctr"/>
             <a:r>
               <a:rPr lang="en-US" sz="6000" kern="0" spc="-100" dirty="0">
                 <a:solidFill>
@@ -3078,7 +3160,6 @@
             </a:r>
           </a:p>
           <a:p>
-            <a:pPr algn="ctr"/>
             <a:r>
               <a:rPr lang="en-US" sz="6000" kern="0" spc="-100" dirty="0">
                 <a:solidFill>
@@ -3094,7 +3175,7 @@
             </a:endParaRPr>
           </a:p>
           <a:p>
-            <a:pPr algn="ctr">
+            <a:pPr>
               <a:lnSpc>
                 <a:spcPts val="6914"/>
               </a:lnSpc>
@@ -3115,8 +3196,8 @@
           </a:p>
         </p:txBody>
       </p:sp>
-      <mc:AlternateContent xmlns:mc="http://schemas.openxmlformats.org/markup-compatibility/2006">
-        <mc:Choice xmlns:a14="http://schemas.microsoft.com/office/drawing/2010/main" Requires="a14">
+      <mc:AlternateContent xmlns:mc="http://schemas.openxmlformats.org/markup-compatibility/2006" xmlns:a14="http://schemas.microsoft.com/office/drawing/2010/main">
+        <mc:Choice Requires="a14">
           <p:sp>
             <p:nvSpPr>
               <p:cNvPr id="14" name="Text Box 242"/>
@@ -3310,7 +3391,7 @@
                             <a:lumOff val="25000"/>
                           </a:schemeClr>
                         </a:solidFill>
-                        <a:latin typeface="+mn-lt"/>
+                        <a:latin typeface="Cambria Math" panose="02040503050406030204" pitchFamily="18" charset="0"/>
                         <a:ea typeface="ＭＳ Ｐゴシック" charset="-128"/>
                       </a:rPr>
                       <m:t>𝛼</m:t>
@@ -3371,7 +3452,7 @@
                             <a:lumOff val="25000"/>
                           </a:schemeClr>
                         </a:solidFill>
-                        <a:latin typeface="+mn-lt"/>
+                        <a:latin typeface="Cambria Math" panose="02040503050406030204" pitchFamily="18" charset="0"/>
                         <a:ea typeface="Cambria Math" panose="02040503050406030204" pitchFamily="18" charset="0"/>
                       </a:rPr>
                       <m:t>⟹</m:t>
@@ -3410,7 +3491,7 @@
                             <a:lumOff val="25000"/>
                           </a:schemeClr>
                         </a:solidFill>
-                        <a:latin typeface="+mn-lt"/>
+                        <a:latin typeface="Cambria Math" panose="02040503050406030204" pitchFamily="18" charset="0"/>
                         <a:ea typeface="Cambria Math" panose="02040503050406030204" pitchFamily="18" charset="0"/>
                       </a:rPr>
                       <m:t>⟹</m:t>
@@ -3459,7 +3540,7 @@
                             <a:lumOff val="25000"/>
                           </a:schemeClr>
                         </a:solidFill>
-                        <a:latin typeface="+mn-lt"/>
+                        <a:latin typeface="Cambria Math" panose="02040503050406030204" pitchFamily="18" charset="0"/>
                         <a:ea typeface="Cambria Math" panose="02040503050406030204" pitchFamily="18" charset="0"/>
                       </a:rPr>
                       <m:t>⟹</m:t>
@@ -3489,7 +3570,7 @@
                             <a:lumOff val="25000"/>
                           </a:schemeClr>
                         </a:solidFill>
-                        <a:latin typeface="+mn-lt"/>
+                        <a:latin typeface="Cambria Math" panose="02040503050406030204" pitchFamily="18" charset="0"/>
                         <a:ea typeface="ＭＳ Ｐゴシック" charset="-128"/>
                       </a:rPr>
                       <m:t>𝑩</m:t>
@@ -3597,7 +3678,7 @@
                             <a:lumOff val="25000"/>
                           </a:schemeClr>
                         </a:solidFill>
-                        <a:latin typeface="+mn-lt"/>
+                        <a:latin typeface="Cambria Math" panose="02040503050406030204" pitchFamily="18" charset="0"/>
                         <a:ea typeface="ＭＳ Ｐゴシック" charset="-128"/>
                       </a:rPr>
                       <m:t>𝛼</m:t>
@@ -3714,7 +3795,7 @@
             </p:txBody>
           </p:sp>
         </mc:Choice>
-        <mc:Fallback>
+        <mc:Fallback xmlns="">
           <p:sp>
             <p:nvSpPr>
               <p:cNvPr id="14" name="Text Box 242"/>
@@ -4053,8 +4134,8 @@
           </a:p>
         </p:txBody>
       </p:sp>
-      <mc:AlternateContent xmlns:mc="http://schemas.openxmlformats.org/markup-compatibility/2006">
-        <mc:Choice xmlns:a14="http://schemas.microsoft.com/office/drawing/2010/main" Requires="a14">
+      <mc:AlternateContent xmlns:mc="http://schemas.openxmlformats.org/markup-compatibility/2006" xmlns:a14="http://schemas.microsoft.com/office/drawing/2010/main">
+        <mc:Choice Requires="a14">
           <p:sp>
             <p:nvSpPr>
               <p:cNvPr id="28" name="Text Box 242"/>
@@ -4215,7 +4296,7 @@
                             <a:lumOff val="25000"/>
                           </a:schemeClr>
                         </a:solidFill>
-                        <a:latin typeface="+mn-lt"/>
+                        <a:latin typeface="Cambria Math" panose="02040503050406030204" pitchFamily="18" charset="0"/>
                         <a:ea typeface="ＭＳ Ｐゴシック" charset="-128"/>
                       </a:rPr>
                       <m:t>𝛼</m:t>
@@ -4288,7 +4369,7 @@
                                 <a:lumOff val="25000"/>
                               </a:schemeClr>
                             </a:solidFill>
-                            <a:latin typeface="+mn-lt"/>
+                            <a:latin typeface="Cambria Math" panose="02040503050406030204" pitchFamily="18" charset="0"/>
                             <a:ea typeface="ＭＳ Ｐゴシック" charset="-128"/>
                           </a:rPr>
                         </m:ctrlPr>
@@ -4302,7 +4383,7 @@
                                 <a:lumOff val="25000"/>
                               </a:schemeClr>
                             </a:solidFill>
-                            <a:latin typeface="+mn-lt"/>
+                            <a:latin typeface="Cambria Math" panose="02040503050406030204" pitchFamily="18" charset="0"/>
                             <a:ea typeface="ＭＳ Ｐゴシック" charset="-128"/>
                           </a:rPr>
                           <m:t>𝛿</m:t>
@@ -4315,7 +4396,7 @@
                                 <a:lumOff val="25000"/>
                               </a:schemeClr>
                             </a:solidFill>
-                            <a:latin typeface="+mn-lt"/>
+                            <a:latin typeface="Cambria Math" panose="02040503050406030204" pitchFamily="18" charset="0"/>
                             <a:ea typeface="ＭＳ Ｐゴシック" charset="-128"/>
                           </a:rPr>
                           <m:t>𝐵</m:t>
@@ -4330,7 +4411,7 @@
                                 <a:lumOff val="25000"/>
                               </a:schemeClr>
                             </a:solidFill>
-                            <a:latin typeface="+mn-lt"/>
+                            <a:latin typeface="Cambria Math" panose="02040503050406030204" pitchFamily="18" charset="0"/>
                             <a:ea typeface="ＭＳ Ｐゴシック" charset="-128"/>
                           </a:rPr>
                           <m:t>𝑅</m:t>
@@ -4345,7 +4426,7 @@
                                 <a:lumOff val="25000"/>
                               </a:schemeClr>
                             </a:solidFill>
-                            <a:latin typeface="+mn-lt"/>
+                            <a:latin typeface="Cambria Math" panose="02040503050406030204" pitchFamily="18" charset="0"/>
                             <a:ea typeface="ＭＳ Ｐゴシック" charset="-128"/>
                           </a:rPr>
                           <m:t>𝑟𝑖𝑝𝑝𝑙𝑒</m:t>
@@ -4360,7 +4441,7 @@
                             <a:lumOff val="25000"/>
                           </a:schemeClr>
                         </a:solidFill>
-                        <a:latin typeface="+mn-lt"/>
+                        <a:latin typeface="Cambria Math" panose="02040503050406030204" pitchFamily="18" charset="0"/>
                         <a:ea typeface="ＭＳ Ｐゴシック" charset="-128"/>
                       </a:rPr>
                       <m:t>=</m:t>
@@ -4375,7 +4456,7 @@
                                 <a:lumOff val="25000"/>
                               </a:schemeClr>
                             </a:solidFill>
-                            <a:latin typeface="+mn-lt"/>
+                            <a:latin typeface="Cambria Math" panose="02040503050406030204" pitchFamily="18" charset="0"/>
                             <a:ea typeface="ＭＳ Ｐゴシック" charset="-128"/>
                           </a:rPr>
                         </m:ctrlPr>
@@ -4391,7 +4472,7 @@
                                     <a:lumOff val="25000"/>
                                   </a:schemeClr>
                                 </a:solidFill>
-                                <a:latin typeface="+mn-lt"/>
+                                <a:latin typeface="Cambria Math" panose="02040503050406030204" pitchFamily="18" charset="0"/>
                                 <a:ea typeface="ＭＳ Ｐゴシック" charset="-128"/>
                               </a:rPr>
                             </m:ctrlPr>
@@ -4405,7 +4486,7 @@
                                     <a:lumOff val="25000"/>
                                   </a:schemeClr>
                                 </a:solidFill>
-                                <a:latin typeface="+mn-lt"/>
+                                <a:latin typeface="Cambria Math" panose="02040503050406030204" pitchFamily="18" charset="0"/>
                                 <a:ea typeface="ＭＳ Ｐゴシック" charset="-128"/>
                               </a:rPr>
                               <m:t>𝐵</m:t>
@@ -4420,7 +4501,7 @@
                                     <a:lumOff val="25000"/>
                                   </a:schemeClr>
                                 </a:solidFill>
-                                <a:latin typeface="+mn-lt"/>
+                                <a:latin typeface="Cambria Math" panose="02040503050406030204" pitchFamily="18" charset="0"/>
                                 <a:ea typeface="ＭＳ Ｐゴシック" charset="-128"/>
                               </a:rPr>
                               <m:t>0</m:t>
@@ -4437,7 +4518,7 @@
                                     <a:lumOff val="25000"/>
                                   </a:schemeClr>
                                 </a:solidFill>
-                                <a:latin typeface="+mn-lt"/>
+                                <a:latin typeface="Cambria Math" panose="02040503050406030204" pitchFamily="18" charset="0"/>
                                 <a:ea typeface="ＭＳ Ｐゴシック" charset="-128"/>
                               </a:rPr>
                             </m:ctrlPr>
@@ -4451,7 +4532,7 @@
                                     <a:lumOff val="25000"/>
                                   </a:schemeClr>
                                 </a:solidFill>
-                                <a:latin typeface="+mn-lt"/>
+                                <a:latin typeface="Cambria Math" panose="02040503050406030204" pitchFamily="18" charset="0"/>
                                 <a:ea typeface="ＭＳ Ｐゴシック" charset="-128"/>
                               </a:rPr>
                               <m:t>𝑅</m:t>
@@ -4466,7 +4547,7 @@
                                     <a:lumOff val="25000"/>
                                   </a:schemeClr>
                                 </a:solidFill>
-                                <a:latin typeface="+mn-lt"/>
+                                <a:latin typeface="Cambria Math" panose="02040503050406030204" pitchFamily="18" charset="0"/>
                                 <a:ea typeface="ＭＳ Ｐゴシック" charset="-128"/>
                               </a:rPr>
                               <m:t>0</m:t>
@@ -4483,7 +4564,7 @@
                                 <a:lumOff val="25000"/>
                               </a:schemeClr>
                             </a:solidFill>
-                            <a:latin typeface="+mn-lt"/>
+                            <a:latin typeface="Cambria Math" panose="02040503050406030204" pitchFamily="18" charset="0"/>
                             <a:ea typeface="ＭＳ Ｐゴシック" charset="-128"/>
                           </a:rPr>
                           <m:t>𝑅</m:t>
@@ -4500,7 +4581,7 @@
                                 <a:lumOff val="25000"/>
                               </a:schemeClr>
                             </a:solidFill>
-                            <a:latin typeface="+mn-lt"/>
+                            <a:latin typeface="Cambria Math" panose="02040503050406030204" pitchFamily="18" charset="0"/>
                             <a:ea typeface="ＭＳ Ｐゴシック" charset="-128"/>
                           </a:rPr>
                         </m:ctrlPr>
@@ -4516,7 +4597,7 @@
                                     <a:lumOff val="25000"/>
                                   </a:schemeClr>
                                 </a:solidFill>
-                                <a:latin typeface="+mn-lt"/>
+                                <a:latin typeface="Cambria Math" panose="02040503050406030204" pitchFamily="18" charset="0"/>
                                 <a:ea typeface="ＭＳ Ｐゴシック" charset="-128"/>
                               </a:rPr>
                             </m:ctrlPr>
@@ -4532,7 +4613,7 @@
                                         <a:lumOff val="25000"/>
                                       </a:schemeClr>
                                     </a:solidFill>
-                                    <a:latin typeface="+mn-lt"/>
+                                    <a:latin typeface="Cambria Math" panose="02040503050406030204" pitchFamily="18" charset="0"/>
                                     <a:ea typeface="ＭＳ Ｐゴシック" charset="-128"/>
                                   </a:rPr>
                                 </m:ctrlPr>
@@ -4546,7 +4627,7 @@
                                         <a:lumOff val="25000"/>
                                       </a:schemeClr>
                                     </a:solidFill>
-                                    <a:latin typeface="+mn-lt"/>
+                                    <a:latin typeface="Cambria Math" panose="02040503050406030204" pitchFamily="18" charset="0"/>
                                     <a:ea typeface="ＭＳ Ｐゴシック" charset="-128"/>
                                   </a:rPr>
                                   <m:t>𝑅</m:t>
@@ -4563,7 +4644,7 @@
                                             <a:lumOff val="25000"/>
                                           </a:schemeClr>
                                         </a:solidFill>
-                                        <a:latin typeface="+mn-lt"/>
+                                        <a:latin typeface="Cambria Math" panose="02040503050406030204" pitchFamily="18" charset="0"/>
                                         <a:ea typeface="ＭＳ Ｐゴシック" charset="-128"/>
                                       </a:rPr>
                                     </m:ctrlPr>
@@ -4577,7 +4658,7 @@
                                             <a:lumOff val="25000"/>
                                           </a:schemeClr>
                                         </a:solidFill>
-                                        <a:latin typeface="+mn-lt"/>
+                                        <a:latin typeface="Cambria Math" panose="02040503050406030204" pitchFamily="18" charset="0"/>
                                         <a:ea typeface="ＭＳ Ｐゴシック" charset="-128"/>
                                       </a:rPr>
                                       <m:t>𝑅</m:t>
@@ -4592,7 +4673,7 @@
                                             <a:lumOff val="25000"/>
                                           </a:schemeClr>
                                         </a:solidFill>
-                                        <a:latin typeface="+mn-lt"/>
+                                        <a:latin typeface="Cambria Math" panose="02040503050406030204" pitchFamily="18" charset="0"/>
                                         <a:ea typeface="ＭＳ Ｐゴシック" charset="-128"/>
                                       </a:rPr>
                                       <m:t>𝑐𝑜𝑖𝑙</m:t>
@@ -4615,7 +4696,7 @@
                                     <a:lumOff val="25000"/>
                                   </a:schemeClr>
                                 </a:solidFill>
-                                <a:latin typeface="+mn-lt"/>
+                                <a:latin typeface="Cambria Math" panose="02040503050406030204" pitchFamily="18" charset="0"/>
                                 <a:ea typeface="ＭＳ Ｐゴシック" charset="-128"/>
                               </a:rPr>
                             </m:ctrlPr>
@@ -4629,7 +4710,7 @@
                                     <a:lumOff val="25000"/>
                                   </a:schemeClr>
                                 </a:solidFill>
-                                <a:latin typeface="+mn-lt"/>
+                                <a:latin typeface="Cambria Math" panose="02040503050406030204" pitchFamily="18" charset="0"/>
                                 <a:ea typeface="ＭＳ Ｐゴシック" charset="-128"/>
                               </a:rPr>
                               <m:t>𝑁</m:t>
@@ -4644,7 +4725,7 @@
                                     <a:lumOff val="25000"/>
                                   </a:schemeClr>
                                 </a:solidFill>
-                                <a:latin typeface="+mn-lt"/>
+                                <a:latin typeface="Cambria Math" panose="02040503050406030204" pitchFamily="18" charset="0"/>
                                 <a:ea typeface="ＭＳ Ｐゴシック" charset="-128"/>
                               </a:rPr>
                               <m:t>𝑐𝑜𝑖𝑙</m:t>
@@ -4663,7 +4744,7 @@
                                 <a:lumOff val="25000"/>
                               </a:schemeClr>
                             </a:solidFill>
-                            <a:latin typeface="+mn-lt"/>
+                            <a:latin typeface="Cambria Math" panose="02040503050406030204" pitchFamily="18" charset="0"/>
                             <a:ea typeface="ＭＳ Ｐゴシック" charset="-128"/>
                           </a:rPr>
                         </m:ctrlPr>
@@ -4680,7 +4761,7 @@
                                 <a:lumOff val="25000"/>
                               </a:schemeClr>
                             </a:solidFill>
-                            <a:latin typeface="+mn-lt"/>
+                            <a:latin typeface="Cambria Math" panose="02040503050406030204" pitchFamily="18" charset="0"/>
                             <a:ea typeface="ＭＳ Ｐゴシック" charset="-128"/>
                           </a:rPr>
                           <m:t>sin</m:t>
@@ -4697,7 +4778,7 @@
                                     <a:lumOff val="25000"/>
                                   </a:schemeClr>
                                 </a:solidFill>
-                                <a:latin typeface="+mn-lt"/>
+                                <a:latin typeface="Cambria Math" panose="02040503050406030204" pitchFamily="18" charset="0"/>
                                 <a:ea typeface="ＭＳ Ｐゴシック" charset="-128"/>
                               </a:rPr>
                             </m:ctrlPr>
@@ -4713,7 +4794,7 @@
                                         <a:lumOff val="25000"/>
                                       </a:schemeClr>
                                     </a:solidFill>
-                                    <a:latin typeface="+mn-lt"/>
+                                    <a:latin typeface="Cambria Math" panose="02040503050406030204" pitchFamily="18" charset="0"/>
                                     <a:ea typeface="ＭＳ Ｐゴシック" charset="-128"/>
                                   </a:rPr>
                                 </m:ctrlPr>
@@ -4727,7 +4808,7 @@
                                         <a:lumOff val="25000"/>
                                       </a:schemeClr>
                                     </a:solidFill>
-                                    <a:latin typeface="+mn-lt"/>
+                                    <a:latin typeface="Cambria Math" panose="02040503050406030204" pitchFamily="18" charset="0"/>
                                     <a:ea typeface="ＭＳ Ｐゴシック" charset="-128"/>
                                   </a:rPr>
                                   <m:t>𝑁</m:t>
@@ -4742,7 +4823,7 @@
                                         <a:lumOff val="25000"/>
                                       </a:schemeClr>
                                     </a:solidFill>
-                                    <a:latin typeface="+mn-lt"/>
+                                    <a:latin typeface="Cambria Math" panose="02040503050406030204" pitchFamily="18" charset="0"/>
                                     <a:ea typeface="ＭＳ Ｐゴシック" charset="-128"/>
                                   </a:rPr>
                                   <m:t>𝑐𝑜𝑖𝑙</m:t>
@@ -4757,7 +4838,7 @@
                                     <a:lumOff val="25000"/>
                                   </a:schemeClr>
                                 </a:solidFill>
-                                <a:latin typeface="+mn-lt"/>
+                                <a:latin typeface="Cambria Math" panose="02040503050406030204" pitchFamily="18" charset="0"/>
                                 <a:ea typeface="ＭＳ Ｐゴシック" charset="-128"/>
                               </a:rPr>
                               <m:t>𝜙</m:t>
@@ -4774,7 +4855,7 @@
                             <a:lumOff val="25000"/>
                           </a:schemeClr>
                         </a:solidFill>
-                        <a:latin typeface="+mn-lt"/>
+                        <a:latin typeface="Cambria Math" panose="02040503050406030204" pitchFamily="18" charset="0"/>
                         <a:ea typeface="ＭＳ Ｐゴシック" charset="-128"/>
                       </a:rPr>
                       <m:t>,</m:t>
@@ -4787,7 +4868,7 @@
                             <a:lumOff val="25000"/>
                           </a:schemeClr>
                         </a:solidFill>
-                        <a:latin typeface="+mn-lt"/>
+                        <a:latin typeface="Cambria Math" panose="02040503050406030204" pitchFamily="18" charset="0"/>
                         <a:ea typeface="ＭＳ Ｐゴシック" charset="-128"/>
                       </a:rPr>
                       <m:t> </m:t>
@@ -4825,7 +4906,7 @@
                                 <a:lumOff val="25000"/>
                               </a:schemeClr>
                             </a:solidFill>
-                            <a:latin typeface="+mn-lt"/>
+                            <a:latin typeface="Cambria Math" panose="02040503050406030204" pitchFamily="18" charset="0"/>
                             <a:ea typeface="ＭＳ Ｐゴシック" charset="-128"/>
                           </a:rPr>
                         </m:ctrlPr>
@@ -4839,7 +4920,7 @@
                                 <a:lumOff val="25000"/>
                               </a:schemeClr>
                             </a:solidFill>
-                            <a:latin typeface="+mn-lt"/>
+                            <a:latin typeface="Cambria Math" panose="02040503050406030204" pitchFamily="18" charset="0"/>
                             <a:ea typeface="ＭＳ Ｐゴシック" charset="-128"/>
                           </a:rPr>
                           <m:t> </m:t>
@@ -4852,7 +4933,7 @@
                                 <a:lumOff val="25000"/>
                               </a:schemeClr>
                             </a:solidFill>
-                            <a:latin typeface="+mn-lt"/>
+                            <a:latin typeface="Cambria Math" panose="02040503050406030204" pitchFamily="18" charset="0"/>
                             <a:ea typeface="ＭＳ Ｐゴシック" charset="-128"/>
                           </a:rPr>
                           <m:t>𝛿</m:t>
@@ -4865,7 +4946,7 @@
                                 <a:lumOff val="25000"/>
                               </a:schemeClr>
                             </a:solidFill>
-                            <a:latin typeface="+mn-lt"/>
+                            <a:latin typeface="Cambria Math" panose="02040503050406030204" pitchFamily="18" charset="0"/>
                             <a:ea typeface="ＭＳ Ｐゴシック" charset="-128"/>
                           </a:rPr>
                           <m:t>𝐵</m:t>
@@ -4880,7 +4961,7 @@
                                 <a:lumOff val="25000"/>
                               </a:schemeClr>
                             </a:solidFill>
-                            <a:latin typeface="+mn-lt"/>
+                            <a:latin typeface="Cambria Math" panose="02040503050406030204" pitchFamily="18" charset="0"/>
                             <a:ea typeface="ＭＳ Ｐゴシック" charset="-128"/>
                           </a:rPr>
                           <m:t>𝜙</m:t>
@@ -4895,7 +4976,7 @@
                                 <a:lumOff val="25000"/>
                               </a:schemeClr>
                             </a:solidFill>
-                            <a:latin typeface="+mn-lt"/>
+                            <a:latin typeface="Cambria Math" panose="02040503050406030204" pitchFamily="18" charset="0"/>
                             <a:ea typeface="ＭＳ Ｐゴシック" charset="-128"/>
                           </a:rPr>
                           <m:t>𝑟𝑖𝑝𝑝𝑙𝑒</m:t>
@@ -4910,7 +4991,7 @@
                             <a:lumOff val="25000"/>
                           </a:schemeClr>
                         </a:solidFill>
-                        <a:latin typeface="+mn-lt"/>
+                        <a:latin typeface="Cambria Math" panose="02040503050406030204" pitchFamily="18" charset="0"/>
                         <a:ea typeface="ＭＳ Ｐゴシック" charset="-128"/>
                       </a:rPr>
                       <m:t>=</m:t>
@@ -4925,7 +5006,7 @@
                                 <a:lumOff val="25000"/>
                               </a:schemeClr>
                             </a:solidFill>
-                            <a:latin typeface="+mn-lt"/>
+                            <a:latin typeface="Cambria Math" panose="02040503050406030204" pitchFamily="18" charset="0"/>
                             <a:ea typeface="ＭＳ Ｐゴシック" charset="-128"/>
                           </a:rPr>
                         </m:ctrlPr>
@@ -4941,7 +5022,7 @@
                                     <a:lumOff val="25000"/>
                                   </a:schemeClr>
                                 </a:solidFill>
-                                <a:latin typeface="+mn-lt"/>
+                                <a:latin typeface="Cambria Math" panose="02040503050406030204" pitchFamily="18" charset="0"/>
                                 <a:ea typeface="ＭＳ Ｐゴシック" charset="-128"/>
                               </a:rPr>
                             </m:ctrlPr>
@@ -4955,7 +5036,7 @@
                                     <a:lumOff val="25000"/>
                                   </a:schemeClr>
                                 </a:solidFill>
-                                <a:latin typeface="+mn-lt"/>
+                                <a:latin typeface="Cambria Math" panose="02040503050406030204" pitchFamily="18" charset="0"/>
                                 <a:ea typeface="ＭＳ Ｐゴシック" charset="-128"/>
                               </a:rPr>
                               <m:t>𝐵</m:t>
@@ -4970,7 +5051,7 @@
                                     <a:lumOff val="25000"/>
                                   </a:schemeClr>
                                 </a:solidFill>
-                                <a:latin typeface="+mn-lt"/>
+                                <a:latin typeface="Cambria Math" panose="02040503050406030204" pitchFamily="18" charset="0"/>
                                 <a:ea typeface="ＭＳ Ｐゴシック" charset="-128"/>
                               </a:rPr>
                               <m:t>0</m:t>
@@ -4987,7 +5068,7 @@
                                     <a:lumOff val="25000"/>
                                   </a:schemeClr>
                                 </a:solidFill>
-                                <a:latin typeface="+mn-lt"/>
+                                <a:latin typeface="Cambria Math" panose="02040503050406030204" pitchFamily="18" charset="0"/>
                                 <a:ea typeface="ＭＳ Ｐゴシック" charset="-128"/>
                               </a:rPr>
                             </m:ctrlPr>
@@ -5001,7 +5082,7 @@
                                     <a:lumOff val="25000"/>
                                   </a:schemeClr>
                                 </a:solidFill>
-                                <a:latin typeface="+mn-lt"/>
+                                <a:latin typeface="Cambria Math" panose="02040503050406030204" pitchFamily="18" charset="0"/>
                                 <a:ea typeface="ＭＳ Ｐゴシック" charset="-128"/>
                               </a:rPr>
                               <m:t>𝑅</m:t>
@@ -5016,7 +5097,7 @@
                                     <a:lumOff val="25000"/>
                                   </a:schemeClr>
                                 </a:solidFill>
-                                <a:latin typeface="+mn-lt"/>
+                                <a:latin typeface="Cambria Math" panose="02040503050406030204" pitchFamily="18" charset="0"/>
                                 <a:ea typeface="ＭＳ Ｐゴシック" charset="-128"/>
                               </a:rPr>
                               <m:t>0</m:t>
@@ -5033,7 +5114,7 @@
                                 <a:lumOff val="25000"/>
                               </a:schemeClr>
                             </a:solidFill>
-                            <a:latin typeface="+mn-lt"/>
+                            <a:latin typeface="Cambria Math" panose="02040503050406030204" pitchFamily="18" charset="0"/>
                             <a:ea typeface="ＭＳ Ｐゴシック" charset="-128"/>
                           </a:rPr>
                           <m:t>𝑅</m:t>
@@ -5050,7 +5131,7 @@
                                 <a:lumOff val="25000"/>
                               </a:schemeClr>
                             </a:solidFill>
-                            <a:latin typeface="+mn-lt"/>
+                            <a:latin typeface="Cambria Math" panose="02040503050406030204" pitchFamily="18" charset="0"/>
                             <a:ea typeface="ＭＳ Ｐゴシック" charset="-128"/>
                           </a:rPr>
                         </m:ctrlPr>
@@ -5066,7 +5147,7 @@
                                     <a:lumOff val="25000"/>
                                   </a:schemeClr>
                                 </a:solidFill>
-                                <a:latin typeface="+mn-lt"/>
+                                <a:latin typeface="Cambria Math" panose="02040503050406030204" pitchFamily="18" charset="0"/>
                                 <a:ea typeface="ＭＳ Ｐゴシック" charset="-128"/>
                               </a:rPr>
                             </m:ctrlPr>
@@ -5082,7 +5163,7 @@
                                         <a:lumOff val="25000"/>
                                       </a:schemeClr>
                                     </a:solidFill>
-                                    <a:latin typeface="+mn-lt"/>
+                                    <a:latin typeface="Cambria Math" panose="02040503050406030204" pitchFamily="18" charset="0"/>
                                     <a:ea typeface="ＭＳ Ｐゴシック" charset="-128"/>
                                   </a:rPr>
                                 </m:ctrlPr>
@@ -5096,7 +5177,7 @@
                                         <a:lumOff val="25000"/>
                                       </a:schemeClr>
                                     </a:solidFill>
-                                    <a:latin typeface="+mn-lt"/>
+                                    <a:latin typeface="Cambria Math" panose="02040503050406030204" pitchFamily="18" charset="0"/>
                                     <a:ea typeface="ＭＳ Ｐゴシック" charset="-128"/>
                                   </a:rPr>
                                   <m:t>𝑅</m:t>
@@ -5113,7 +5194,7 @@
                                             <a:lumOff val="25000"/>
                                           </a:schemeClr>
                                         </a:solidFill>
-                                        <a:latin typeface="+mn-lt"/>
+                                        <a:latin typeface="Cambria Math" panose="02040503050406030204" pitchFamily="18" charset="0"/>
                                         <a:ea typeface="ＭＳ Ｐゴシック" charset="-128"/>
                                       </a:rPr>
                                     </m:ctrlPr>
@@ -5127,7 +5208,7 @@
                                             <a:lumOff val="25000"/>
                                           </a:schemeClr>
                                         </a:solidFill>
-                                        <a:latin typeface="+mn-lt"/>
+                                        <a:latin typeface="Cambria Math" panose="02040503050406030204" pitchFamily="18" charset="0"/>
                                         <a:ea typeface="ＭＳ Ｐゴシック" charset="-128"/>
                                       </a:rPr>
                                       <m:t>𝑅</m:t>
@@ -5142,7 +5223,7 @@
                                             <a:lumOff val="25000"/>
                                           </a:schemeClr>
                                         </a:solidFill>
-                                        <a:latin typeface="+mn-lt"/>
+                                        <a:latin typeface="Cambria Math" panose="02040503050406030204" pitchFamily="18" charset="0"/>
                                         <a:ea typeface="ＭＳ Ｐゴシック" charset="-128"/>
                                       </a:rPr>
                                       <m:t>𝑐𝑜𝑖𝑙</m:t>
@@ -5165,7 +5246,7 @@
                                     <a:lumOff val="25000"/>
                                   </a:schemeClr>
                                 </a:solidFill>
-                                <a:latin typeface="+mn-lt"/>
+                                <a:latin typeface="Cambria Math" panose="02040503050406030204" pitchFamily="18" charset="0"/>
                                 <a:ea typeface="ＭＳ Ｐゴシック" charset="-128"/>
                               </a:rPr>
                             </m:ctrlPr>
@@ -5179,7 +5260,7 @@
                                     <a:lumOff val="25000"/>
                                   </a:schemeClr>
                                 </a:solidFill>
-                                <a:latin typeface="+mn-lt"/>
+                                <a:latin typeface="Cambria Math" panose="02040503050406030204" pitchFamily="18" charset="0"/>
                                 <a:ea typeface="ＭＳ Ｐゴシック" charset="-128"/>
                               </a:rPr>
                               <m:t>𝑁</m:t>
@@ -5194,7 +5275,7 @@
                                     <a:lumOff val="25000"/>
                                   </a:schemeClr>
                                 </a:solidFill>
-                                <a:latin typeface="+mn-lt"/>
+                                <a:latin typeface="Cambria Math" panose="02040503050406030204" pitchFamily="18" charset="0"/>
                                 <a:ea typeface="ＭＳ Ｐゴシック" charset="-128"/>
                               </a:rPr>
                               <m:t>𝑐𝑜𝑖𝑙</m:t>
@@ -5213,7 +5294,7 @@
                                 <a:lumOff val="25000"/>
                               </a:schemeClr>
                             </a:solidFill>
-                            <a:latin typeface="+mn-lt"/>
+                            <a:latin typeface="Cambria Math" panose="02040503050406030204" pitchFamily="18" charset="0"/>
                             <a:ea typeface="ＭＳ Ｐゴシック" charset="-128"/>
                           </a:rPr>
                         </m:ctrlPr>
@@ -5230,7 +5311,7 @@
                                 <a:lumOff val="25000"/>
                               </a:schemeClr>
                             </a:solidFill>
-                            <a:latin typeface="+mn-lt"/>
+                            <a:latin typeface="Cambria Math" panose="02040503050406030204" pitchFamily="18" charset="0"/>
                             <a:ea typeface="ＭＳ Ｐゴシック" charset="-128"/>
                           </a:rPr>
                           <m:t>cos</m:t>
@@ -5247,7 +5328,7 @@
                                     <a:lumOff val="25000"/>
                                   </a:schemeClr>
                                 </a:solidFill>
-                                <a:latin typeface="+mn-lt"/>
+                                <a:latin typeface="Cambria Math" panose="02040503050406030204" pitchFamily="18" charset="0"/>
                                 <a:ea typeface="ＭＳ Ｐゴシック" charset="-128"/>
                               </a:rPr>
                             </m:ctrlPr>
@@ -5263,7 +5344,7 @@
                                         <a:lumOff val="25000"/>
                                       </a:schemeClr>
                                     </a:solidFill>
-                                    <a:latin typeface="+mn-lt"/>
+                                    <a:latin typeface="Cambria Math" panose="02040503050406030204" pitchFamily="18" charset="0"/>
                                     <a:ea typeface="ＭＳ Ｐゴシック" charset="-128"/>
                                   </a:rPr>
                                 </m:ctrlPr>
@@ -5277,7 +5358,7 @@
                                         <a:lumOff val="25000"/>
                                       </a:schemeClr>
                                     </a:solidFill>
-                                    <a:latin typeface="+mn-lt"/>
+                                    <a:latin typeface="Cambria Math" panose="02040503050406030204" pitchFamily="18" charset="0"/>
                                     <a:ea typeface="ＭＳ Ｐゴシック" charset="-128"/>
                                   </a:rPr>
                                   <m:t>𝑁</m:t>
@@ -5292,7 +5373,7 @@
                                         <a:lumOff val="25000"/>
                                       </a:schemeClr>
                                     </a:solidFill>
-                                    <a:latin typeface="+mn-lt"/>
+                                    <a:latin typeface="Cambria Math" panose="02040503050406030204" pitchFamily="18" charset="0"/>
                                     <a:ea typeface="ＭＳ Ｐゴシック" charset="-128"/>
                                   </a:rPr>
                                   <m:t>𝑐𝑜𝑖𝑙</m:t>
@@ -5307,7 +5388,7 @@
                                     <a:lumOff val="25000"/>
                                   </a:schemeClr>
                                 </a:solidFill>
-                                <a:latin typeface="+mn-lt"/>
+                                <a:latin typeface="Cambria Math" panose="02040503050406030204" pitchFamily="18" charset="0"/>
                                 <a:ea typeface="ＭＳ Ｐゴシック" charset="-128"/>
                               </a:rPr>
                               <m:t>𝜙</m:t>
@@ -5324,7 +5405,7 @@
                             <a:lumOff val="25000"/>
                           </a:schemeClr>
                         </a:solidFill>
-                        <a:latin typeface="+mn-lt"/>
+                        <a:latin typeface="Cambria Math" panose="02040503050406030204" pitchFamily="18" charset="0"/>
                         <a:ea typeface="ＭＳ Ｐゴシック" charset="-128"/>
                       </a:rPr>
                       <m:t>,</m:t>
@@ -5337,7 +5418,7 @@
                             <a:lumOff val="25000"/>
                           </a:schemeClr>
                         </a:solidFill>
-                        <a:latin typeface="+mn-lt"/>
+                        <a:latin typeface="Cambria Math" panose="02040503050406030204" pitchFamily="18" charset="0"/>
                         <a:ea typeface="ＭＳ Ｐゴシック" charset="-128"/>
                       </a:rPr>
                       <m:t> </m:t>
@@ -5373,7 +5454,7 @@
                             <a:lumOff val="25000"/>
                           </a:schemeClr>
                         </a:solidFill>
-                        <a:latin typeface="+mn-lt"/>
+                        <a:latin typeface="Cambria Math" panose="02040503050406030204" pitchFamily="18" charset="0"/>
                         <a:ea typeface="ＭＳ Ｐゴシック" charset="-128"/>
                       </a:rPr>
                       <m:t>𝛿</m:t>
@@ -5388,7 +5469,7 @@
                                 <a:lumOff val="25000"/>
                               </a:schemeClr>
                             </a:solidFill>
-                            <a:latin typeface="+mn-lt"/>
+                            <a:latin typeface="Cambria Math" panose="02040503050406030204" pitchFamily="18" charset="0"/>
                             <a:ea typeface="ＭＳ Ｐゴシック" charset="-128"/>
                           </a:rPr>
                         </m:ctrlPr>
@@ -5402,7 +5483,7 @@
                                 <a:lumOff val="25000"/>
                               </a:schemeClr>
                             </a:solidFill>
-                            <a:latin typeface="+mn-lt"/>
+                            <a:latin typeface="Cambria Math" panose="02040503050406030204" pitchFamily="18" charset="0"/>
                             <a:ea typeface="ＭＳ Ｐゴシック" charset="-128"/>
                           </a:rPr>
                           <m:t>𝐵</m:t>
@@ -5417,7 +5498,7 @@
                                 <a:lumOff val="25000"/>
                               </a:schemeClr>
                             </a:solidFill>
-                            <a:latin typeface="+mn-lt"/>
+                            <a:latin typeface="Cambria Math" panose="02040503050406030204" pitchFamily="18" charset="0"/>
                             <a:ea typeface="ＭＳ Ｐゴシック" charset="-128"/>
                           </a:rPr>
                           <m:t>𝑍</m:t>
@@ -5432,7 +5513,7 @@
                                 <a:lumOff val="25000"/>
                               </a:schemeClr>
                             </a:solidFill>
-                            <a:latin typeface="+mn-lt"/>
+                            <a:latin typeface="Cambria Math" panose="02040503050406030204" pitchFamily="18" charset="0"/>
                             <a:ea typeface="ＭＳ Ｐゴシック" charset="-128"/>
                           </a:rPr>
                           <m:t>𝑟𝑖𝑝𝑝𝑙𝑒</m:t>
@@ -5447,7 +5528,7 @@
                             <a:lumOff val="25000"/>
                           </a:schemeClr>
                         </a:solidFill>
-                        <a:latin typeface="+mn-lt"/>
+                        <a:latin typeface="Cambria Math" panose="02040503050406030204" pitchFamily="18" charset="0"/>
                         <a:ea typeface="ＭＳ Ｐゴシック" charset="-128"/>
                       </a:rPr>
                       <m:t>=0, </m:t>
@@ -5520,7 +5601,7 @@
                                 <a:lumOff val="25000"/>
                               </a:schemeClr>
                             </a:solidFill>
-                            <a:latin typeface="+mn-lt"/>
+                            <a:latin typeface="Cambria Math" panose="02040503050406030204" pitchFamily="18" charset="0"/>
                             <a:ea typeface="ＭＳ Ｐゴシック" charset="-128"/>
                           </a:rPr>
                         </m:ctrlPr>
@@ -5534,7 +5615,7 @@
                                 <a:lumOff val="25000"/>
                               </a:schemeClr>
                             </a:solidFill>
-                            <a:latin typeface="+mn-lt"/>
+                            <a:latin typeface="Cambria Math" panose="02040503050406030204" pitchFamily="18" charset="0"/>
                             <a:ea typeface="ＭＳ Ｐゴシック" charset="-128"/>
                           </a:rPr>
                           <m:t>𝑁</m:t>
@@ -5549,7 +5630,7 @@
                                 <a:lumOff val="25000"/>
                               </a:schemeClr>
                             </a:solidFill>
-                            <a:latin typeface="+mn-lt"/>
+                            <a:latin typeface="Cambria Math" panose="02040503050406030204" pitchFamily="18" charset="0"/>
                             <a:ea typeface="ＭＳ Ｐゴシック" charset="-128"/>
                           </a:rPr>
                           <m:t>𝑐𝑜𝑖𝑙</m:t>
@@ -5564,7 +5645,7 @@
                             <a:lumOff val="25000"/>
                           </a:schemeClr>
                         </a:solidFill>
-                        <a:latin typeface="+mn-lt"/>
+                        <a:latin typeface="Cambria Math" panose="02040503050406030204" pitchFamily="18" charset="0"/>
                         <a:ea typeface="ＭＳ Ｐゴシック" charset="-128"/>
                       </a:rPr>
                       <m:t>= </m:t>
@@ -5762,7 +5843,7 @@
                                 <a:lumOff val="25000"/>
                               </a:schemeClr>
                             </a:solidFill>
-                            <a:latin typeface="+mn-lt"/>
+                            <a:latin typeface="Cambria Math" panose="02040503050406030204" pitchFamily="18" charset="0"/>
                             <a:ea typeface="ＭＳ Ｐゴシック" charset="-128"/>
                           </a:rPr>
                         </m:ctrlPr>
@@ -5776,7 +5857,7 @@
                                 <a:lumOff val="25000"/>
                               </a:schemeClr>
                             </a:solidFill>
-                            <a:latin typeface="+mn-lt"/>
+                            <a:latin typeface="Cambria Math" panose="02040503050406030204" pitchFamily="18" charset="0"/>
                             <a:ea typeface="ＭＳ Ｐゴシック" charset="-128"/>
                           </a:rPr>
                           <m:t>𝑅</m:t>
@@ -5791,7 +5872,7 @@
                                 <a:lumOff val="25000"/>
                               </a:schemeClr>
                             </a:solidFill>
-                            <a:latin typeface="+mn-lt"/>
+                            <a:latin typeface="Cambria Math" panose="02040503050406030204" pitchFamily="18" charset="0"/>
                             <a:ea typeface="ＭＳ Ｐゴシック" charset="-128"/>
                           </a:rPr>
                           <m:t>𝑐𝑜𝑖𝑙</m:t>
@@ -5806,7 +5887,7 @@
                             <a:lumOff val="25000"/>
                           </a:schemeClr>
                         </a:solidFill>
-                        <a:latin typeface="+mn-lt"/>
+                        <a:latin typeface="Cambria Math" panose="02040503050406030204" pitchFamily="18" charset="0"/>
                         <a:ea typeface="ＭＳ Ｐゴシック" charset="-128"/>
                       </a:rPr>
                       <m:t>=</m:t>
@@ -6199,7 +6280,7 @@
                                 <a:lumOff val="25000"/>
                               </a:schemeClr>
                             </a:solidFill>
-                            <a:latin typeface="+mn-lt"/>
+                            <a:latin typeface="Cambria Math" panose="02040503050406030204" pitchFamily="18" charset="0"/>
                             <a:ea typeface="ＭＳ Ｐゴシック" charset="-128"/>
                           </a:rPr>
                         </m:ctrlPr>
@@ -6213,7 +6294,7 @@
                                 <a:lumOff val="25000"/>
                               </a:schemeClr>
                             </a:solidFill>
-                            <a:latin typeface="+mn-lt"/>
+                            <a:latin typeface="Cambria Math" panose="02040503050406030204" pitchFamily="18" charset="0"/>
                             <a:ea typeface="ＭＳ Ｐゴシック" charset="-128"/>
                           </a:rPr>
                           <m:t>𝑁</m:t>
@@ -6228,7 +6309,7 @@
                                 <a:lumOff val="25000"/>
                               </a:schemeClr>
                             </a:solidFill>
-                            <a:latin typeface="+mn-lt"/>
+                            <a:latin typeface="Cambria Math" panose="02040503050406030204" pitchFamily="18" charset="0"/>
                             <a:ea typeface="ＭＳ Ｐゴシック" charset="-128"/>
                           </a:rPr>
                           <m:t>𝑐𝑜𝑖𝑙</m:t>
@@ -6262,7 +6343,7 @@
                                 <a:lumOff val="25000"/>
                               </a:schemeClr>
                             </a:solidFill>
-                            <a:latin typeface="+mn-lt"/>
+                            <a:latin typeface="Cambria Math" panose="02040503050406030204" pitchFamily="18" charset="0"/>
                             <a:ea typeface="ＭＳ Ｐゴシック" charset="-128"/>
                           </a:rPr>
                         </m:ctrlPr>
@@ -6276,7 +6357,7 @@
                                 <a:lumOff val="25000"/>
                               </a:schemeClr>
                             </a:solidFill>
-                            <a:latin typeface="+mn-lt"/>
+                            <a:latin typeface="Cambria Math" panose="02040503050406030204" pitchFamily="18" charset="0"/>
                             <a:ea typeface="ＭＳ Ｐゴシック" charset="-128"/>
                           </a:rPr>
                           <m:t>𝑅</m:t>
@@ -6291,7 +6372,7 @@
                                 <a:lumOff val="25000"/>
                               </a:schemeClr>
                             </a:solidFill>
-                            <a:latin typeface="+mn-lt"/>
+                            <a:latin typeface="Cambria Math" panose="02040503050406030204" pitchFamily="18" charset="0"/>
                             <a:ea typeface="ＭＳ Ｐゴシック" charset="-128"/>
                           </a:rPr>
                           <m:t>𝑐𝑜𝑖𝑙</m:t>
@@ -6430,7 +6511,7 @@
                                 <a:lumOff val="25000"/>
                               </a:schemeClr>
                             </a:solidFill>
-                            <a:latin typeface="+mn-lt"/>
+                            <a:latin typeface="Cambria Math" panose="02040503050406030204" pitchFamily="18" charset="0"/>
                             <a:ea typeface="ＭＳ Ｐゴシック" charset="-128"/>
                           </a:rPr>
                         </m:ctrlPr>
@@ -6444,7 +6525,7 @@
                                 <a:lumOff val="25000"/>
                               </a:schemeClr>
                             </a:solidFill>
-                            <a:latin typeface="+mn-lt"/>
+                            <a:latin typeface="Cambria Math" panose="02040503050406030204" pitchFamily="18" charset="0"/>
                             <a:ea typeface="ＭＳ Ｐゴシック" charset="-128"/>
                           </a:rPr>
                           <m:t>𝐼</m:t>
@@ -6459,7 +6540,7 @@
                                 <a:lumOff val="25000"/>
                               </a:schemeClr>
                             </a:solidFill>
-                            <a:latin typeface="+mn-lt"/>
+                            <a:latin typeface="Cambria Math" panose="02040503050406030204" pitchFamily="18" charset="0"/>
                             <a:ea typeface="ＭＳ Ｐゴシック" charset="-128"/>
                           </a:rPr>
                           <m:t>𝑘</m:t>
@@ -6474,7 +6555,7 @@
                                 <a:lumOff val="25000"/>
                               </a:schemeClr>
                             </a:solidFill>
-                            <a:latin typeface="+mn-lt"/>
+                            <a:latin typeface="Cambria Math" panose="02040503050406030204" pitchFamily="18" charset="0"/>
                             <a:ea typeface="ＭＳ Ｐゴシック" charset="-128"/>
                           </a:rPr>
                           <m:t>𝑢𝑝𝑝𝑒𝑟</m:t>
@@ -6489,7 +6570,7 @@
                             <a:lumOff val="25000"/>
                           </a:schemeClr>
                         </a:solidFill>
-                        <a:latin typeface="+mn-lt"/>
+                        <a:latin typeface="Cambria Math" panose="02040503050406030204" pitchFamily="18" charset="0"/>
                         <a:ea typeface="ＭＳ Ｐゴシック" charset="-128"/>
                       </a:rPr>
                       <m:t>=</m:t>
@@ -6504,7 +6585,7 @@
                                 <a:lumOff val="25000"/>
                               </a:schemeClr>
                             </a:solidFill>
-                            <a:latin typeface="+mn-lt"/>
+                            <a:latin typeface="Cambria Math" panose="02040503050406030204" pitchFamily="18" charset="0"/>
                             <a:ea typeface="ＭＳ Ｐゴシック" charset="-128"/>
                           </a:rPr>
                         </m:ctrlPr>
@@ -6518,7 +6599,7 @@
                                 <a:lumOff val="25000"/>
                               </a:schemeClr>
                             </a:solidFill>
-                            <a:latin typeface="+mn-lt"/>
+                            <a:latin typeface="Cambria Math" panose="02040503050406030204" pitchFamily="18" charset="0"/>
                             <a:ea typeface="ＭＳ Ｐゴシック" charset="-128"/>
                           </a:rPr>
                           <m:t>𝐼</m:t>
@@ -6533,7 +6614,7 @@
                                 <a:lumOff val="25000"/>
                               </a:schemeClr>
                             </a:solidFill>
-                            <a:latin typeface="+mn-lt"/>
+                            <a:latin typeface="Cambria Math" panose="02040503050406030204" pitchFamily="18" charset="0"/>
                             <a:ea typeface="ＭＳ Ｐゴシック" charset="-128"/>
                           </a:rPr>
                           <m:t>0</m:t>
@@ -6550,7 +6631,7 @@
                                 <a:lumOff val="25000"/>
                               </a:schemeClr>
                             </a:solidFill>
-                            <a:latin typeface="+mn-lt"/>
+                            <a:latin typeface="Cambria Math" panose="02040503050406030204" pitchFamily="18" charset="0"/>
                             <a:ea typeface="ＭＳ Ｐゴシック" charset="-128"/>
                           </a:rPr>
                         </m:ctrlPr>
@@ -6567,7 +6648,7 @@
                                 <a:lumOff val="25000"/>
                               </a:schemeClr>
                             </a:solidFill>
-                            <a:latin typeface="+mn-lt"/>
+                            <a:latin typeface="Cambria Math" panose="02040503050406030204" pitchFamily="18" charset="0"/>
                             <a:ea typeface="ＭＳ Ｐゴシック" charset="-128"/>
                           </a:rPr>
                           <m:t>cos</m:t>
@@ -6582,7 +6663,7 @@
                                 <a:lumOff val="25000"/>
                               </a:schemeClr>
                             </a:solidFill>
-                            <a:latin typeface="+mn-lt"/>
+                            <a:latin typeface="Cambria Math" panose="02040503050406030204" pitchFamily="18" charset="0"/>
                             <a:ea typeface="ＭＳ Ｐゴシック" charset="-128"/>
                           </a:rPr>
                           <m:t>(</m:t>
@@ -6595,7 +6676,7 @@
                                 <a:lumOff val="25000"/>
                               </a:schemeClr>
                             </a:solidFill>
-                            <a:latin typeface="+mn-lt"/>
+                            <a:latin typeface="Cambria Math" panose="02040503050406030204" pitchFamily="18" charset="0"/>
                             <a:ea typeface="ＭＳ Ｐゴシック" charset="-128"/>
                           </a:rPr>
                           <m:t>𝑛</m:t>
@@ -6610,7 +6691,7 @@
                                     <a:lumOff val="25000"/>
                                   </a:schemeClr>
                                 </a:solidFill>
-                                <a:latin typeface="+mn-lt"/>
+                                <a:latin typeface="Cambria Math" panose="02040503050406030204" pitchFamily="18" charset="0"/>
                                 <a:ea typeface="ＭＳ Ｐゴシック" charset="-128"/>
                               </a:rPr>
                             </m:ctrlPr>
@@ -6624,7 +6705,7 @@
                                     <a:lumOff val="25000"/>
                                   </a:schemeClr>
                                 </a:solidFill>
-                                <a:latin typeface="+mn-lt"/>
+                                <a:latin typeface="Cambria Math" panose="02040503050406030204" pitchFamily="18" charset="0"/>
                                 <a:ea typeface="ＭＳ Ｐゴシック" charset="-128"/>
                               </a:rPr>
                               <m:t>𝜙</m:t>
@@ -6639,7 +6720,7 @@
                                     <a:lumOff val="25000"/>
                                   </a:schemeClr>
                                 </a:solidFill>
-                                <a:latin typeface="+mn-lt"/>
+                                <a:latin typeface="Cambria Math" panose="02040503050406030204" pitchFamily="18" charset="0"/>
                                 <a:ea typeface="ＭＳ Ｐゴシック" charset="-128"/>
                               </a:rPr>
                               <m:t>𝑘</m:t>
@@ -6654,7 +6735,7 @@
                                 <a:lumOff val="25000"/>
                               </a:schemeClr>
                             </a:solidFill>
-                            <a:latin typeface="+mn-lt"/>
+                            <a:latin typeface="Cambria Math" panose="02040503050406030204" pitchFamily="18" charset="0"/>
                             <a:ea typeface="ＭＳ Ｐゴシック" charset="-128"/>
                           </a:rPr>
                           <m:t>+</m:t>
@@ -6670,7 +6751,7 @@
                                 <a:lumOff val="25000"/>
                               </a:schemeClr>
                             </a:solidFill>
-                            <a:latin typeface="+mn-lt"/>
+                            <a:latin typeface="Cambria Math" panose="02040503050406030204" pitchFamily="18" charset="0"/>
                             <a:ea typeface="ＭＳ Ｐゴシック" charset="-128"/>
                           </a:rPr>
                           <m:t>Δ</m:t>
@@ -6683,7 +6764,7 @@
                                 <a:lumOff val="25000"/>
                               </a:schemeClr>
                             </a:solidFill>
-                            <a:latin typeface="+mn-lt"/>
+                            <a:latin typeface="Cambria Math" panose="02040503050406030204" pitchFamily="18" charset="0"/>
                             <a:ea typeface="ＭＳ Ｐゴシック" charset="-128"/>
                           </a:rPr>
                           <m:t>𝜙</m:t>
@@ -6696,7 +6777,7 @@
                                 <a:lumOff val="25000"/>
                               </a:schemeClr>
                             </a:solidFill>
-                            <a:latin typeface="+mn-lt"/>
+                            <a:latin typeface="Cambria Math" panose="02040503050406030204" pitchFamily="18" charset="0"/>
                             <a:ea typeface="ＭＳ Ｐゴシック" charset="-128"/>
                           </a:rPr>
                           <m:t>)</m:t>
@@ -6711,7 +6792,7 @@
                             <a:lumOff val="25000"/>
                           </a:schemeClr>
                         </a:solidFill>
-                        <a:latin typeface="+mn-lt"/>
+                        <a:latin typeface="Cambria Math" panose="02040503050406030204" pitchFamily="18" charset="0"/>
                         <a:ea typeface="ＭＳ Ｐゴシック" charset="-128"/>
                       </a:rPr>
                       <m:t>, </m:t>
@@ -6749,7 +6830,7 @@
                                 <a:lumOff val="25000"/>
                               </a:schemeClr>
                             </a:solidFill>
-                            <a:latin typeface="+mn-lt"/>
+                            <a:latin typeface="Cambria Math" panose="02040503050406030204" pitchFamily="18" charset="0"/>
                             <a:ea typeface="ＭＳ Ｐゴシック" charset="-128"/>
                           </a:rPr>
                         </m:ctrlPr>
@@ -6763,7 +6844,7 @@
                                 <a:lumOff val="25000"/>
                               </a:schemeClr>
                             </a:solidFill>
-                            <a:latin typeface="+mn-lt"/>
+                            <a:latin typeface="Cambria Math" panose="02040503050406030204" pitchFamily="18" charset="0"/>
                             <a:ea typeface="ＭＳ Ｐゴシック" charset="-128"/>
                           </a:rPr>
                           <m:t>𝐼</m:t>
@@ -6778,7 +6859,7 @@
                                 <a:lumOff val="25000"/>
                               </a:schemeClr>
                             </a:solidFill>
-                            <a:latin typeface="+mn-lt"/>
+                            <a:latin typeface="Cambria Math" panose="02040503050406030204" pitchFamily="18" charset="0"/>
                             <a:ea typeface="ＭＳ Ｐゴシック" charset="-128"/>
                           </a:rPr>
                           <m:t>𝑘</m:t>
@@ -6793,7 +6874,7 @@
                                 <a:lumOff val="25000"/>
                               </a:schemeClr>
                             </a:solidFill>
-                            <a:latin typeface="+mn-lt"/>
+                            <a:latin typeface="Cambria Math" panose="02040503050406030204" pitchFamily="18" charset="0"/>
                             <a:ea typeface="ＭＳ Ｐゴシック" charset="-128"/>
                           </a:rPr>
                           <m:t>𝑙𝑜𝑤𝑒𝑟</m:t>
@@ -6808,7 +6889,7 @@
                             <a:lumOff val="25000"/>
                           </a:schemeClr>
                         </a:solidFill>
-                        <a:latin typeface="+mn-lt"/>
+                        <a:latin typeface="Cambria Math" panose="02040503050406030204" pitchFamily="18" charset="0"/>
                         <a:ea typeface="ＭＳ Ｐゴシック" charset="-128"/>
                       </a:rPr>
                       <m:t>=</m:t>
@@ -6823,7 +6904,7 @@
                                 <a:lumOff val="25000"/>
                               </a:schemeClr>
                             </a:solidFill>
-                            <a:latin typeface="+mn-lt"/>
+                            <a:latin typeface="Cambria Math" panose="02040503050406030204" pitchFamily="18" charset="0"/>
                             <a:ea typeface="ＭＳ Ｐゴシック" charset="-128"/>
                           </a:rPr>
                         </m:ctrlPr>
@@ -6837,7 +6918,7 @@
                                 <a:lumOff val="25000"/>
                               </a:schemeClr>
                             </a:solidFill>
-                            <a:latin typeface="+mn-lt"/>
+                            <a:latin typeface="Cambria Math" panose="02040503050406030204" pitchFamily="18" charset="0"/>
                             <a:ea typeface="ＭＳ Ｐゴシック" charset="-128"/>
                           </a:rPr>
                           <m:t>𝐼</m:t>
@@ -6852,7 +6933,7 @@
                                 <a:lumOff val="25000"/>
                               </a:schemeClr>
                             </a:solidFill>
-                            <a:latin typeface="+mn-lt"/>
+                            <a:latin typeface="Cambria Math" panose="02040503050406030204" pitchFamily="18" charset="0"/>
                             <a:ea typeface="ＭＳ Ｐゴシック" charset="-128"/>
                           </a:rPr>
                           <m:t>0</m:t>
@@ -6869,7 +6950,7 @@
                                 <a:lumOff val="25000"/>
                               </a:schemeClr>
                             </a:solidFill>
-                            <a:latin typeface="+mn-lt"/>
+                            <a:latin typeface="Cambria Math" panose="02040503050406030204" pitchFamily="18" charset="0"/>
                             <a:ea typeface="ＭＳ Ｐゴシック" charset="-128"/>
                           </a:rPr>
                         </m:ctrlPr>
@@ -6886,7 +6967,7 @@
                                 <a:lumOff val="25000"/>
                               </a:schemeClr>
                             </a:solidFill>
-                            <a:latin typeface="+mn-lt"/>
+                            <a:latin typeface="Cambria Math" panose="02040503050406030204" pitchFamily="18" charset="0"/>
                             <a:ea typeface="ＭＳ Ｐゴシック" charset="-128"/>
                           </a:rPr>
                           <m:t>cos</m:t>
@@ -6901,7 +6982,7 @@
                                 <a:lumOff val="25000"/>
                               </a:schemeClr>
                             </a:solidFill>
-                            <a:latin typeface="+mn-lt"/>
+                            <a:latin typeface="Cambria Math" panose="02040503050406030204" pitchFamily="18" charset="0"/>
                             <a:ea typeface="ＭＳ Ｐゴシック" charset="-128"/>
                           </a:rPr>
                           <m:t>(</m:t>
@@ -6914,7 +6995,7 @@
                                 <a:lumOff val="25000"/>
                               </a:schemeClr>
                             </a:solidFill>
-                            <a:latin typeface="+mn-lt"/>
+                            <a:latin typeface="Cambria Math" panose="02040503050406030204" pitchFamily="18" charset="0"/>
                             <a:ea typeface="ＭＳ Ｐゴシック" charset="-128"/>
                           </a:rPr>
                           <m:t>𝑛</m:t>
@@ -6929,7 +7010,7 @@
                                     <a:lumOff val="25000"/>
                                   </a:schemeClr>
                                 </a:solidFill>
-                                <a:latin typeface="+mn-lt"/>
+                                <a:latin typeface="Cambria Math" panose="02040503050406030204" pitchFamily="18" charset="0"/>
                                 <a:ea typeface="ＭＳ Ｐゴシック" charset="-128"/>
                               </a:rPr>
                             </m:ctrlPr>
@@ -6943,7 +7024,7 @@
                                     <a:lumOff val="25000"/>
                                   </a:schemeClr>
                                 </a:solidFill>
-                                <a:latin typeface="+mn-lt"/>
+                                <a:latin typeface="Cambria Math" panose="02040503050406030204" pitchFamily="18" charset="0"/>
                                 <a:ea typeface="ＭＳ Ｐゴシック" charset="-128"/>
                               </a:rPr>
                               <m:t>𝜙</m:t>
@@ -6958,7 +7039,7 @@
                                     <a:lumOff val="25000"/>
                                   </a:schemeClr>
                                 </a:solidFill>
-                                <a:latin typeface="+mn-lt"/>
+                                <a:latin typeface="Cambria Math" panose="02040503050406030204" pitchFamily="18" charset="0"/>
                                 <a:ea typeface="ＭＳ Ｐゴシック" charset="-128"/>
                               </a:rPr>
                               <m:t>𝑘</m:t>
@@ -6973,7 +7054,7 @@
                                 <a:lumOff val="25000"/>
                               </a:schemeClr>
                             </a:solidFill>
-                            <a:latin typeface="+mn-lt"/>
+                            <a:latin typeface="Cambria Math" panose="02040503050406030204" pitchFamily="18" charset="0"/>
                             <a:ea typeface="ＭＳ Ｐゴシック" charset="-128"/>
                           </a:rPr>
                           <m:t>)</m:t>
@@ -6988,7 +7069,7 @@
                             <a:lumOff val="25000"/>
                           </a:schemeClr>
                         </a:solidFill>
-                        <a:latin typeface="+mn-lt"/>
+                        <a:latin typeface="Cambria Math" panose="02040503050406030204" pitchFamily="18" charset="0"/>
                         <a:ea typeface="ＭＳ Ｐゴシック" charset="-128"/>
                       </a:rPr>
                       <m:t>,</m:t>
@@ -7048,7 +7129,7 @@
                                 <a:lumOff val="25000"/>
                               </a:schemeClr>
                             </a:solidFill>
-                            <a:latin typeface="+mn-lt"/>
+                            <a:latin typeface="Cambria Math" panose="02040503050406030204" pitchFamily="18" charset="0"/>
                             <a:ea typeface="ＭＳ Ｐゴシック" charset="-128"/>
                           </a:rPr>
                         </m:ctrlPr>
@@ -7062,7 +7143,7 @@
                                 <a:lumOff val="25000"/>
                               </a:schemeClr>
                             </a:solidFill>
-                            <a:latin typeface="+mn-lt"/>
+                            <a:latin typeface="Cambria Math" panose="02040503050406030204" pitchFamily="18" charset="0"/>
                             <a:ea typeface="ＭＳ Ｐゴシック" charset="-128"/>
                           </a:rPr>
                           <m:t>𝜙</m:t>
@@ -7077,7 +7158,7 @@
                                 <a:lumOff val="25000"/>
                               </a:schemeClr>
                             </a:solidFill>
-                            <a:latin typeface="+mn-lt"/>
+                            <a:latin typeface="Cambria Math" panose="02040503050406030204" pitchFamily="18" charset="0"/>
                             <a:ea typeface="ＭＳ Ｐゴシック" charset="-128"/>
                           </a:rPr>
                           <m:t>𝑘</m:t>
@@ -7146,7 +7227,7 @@
                                 <a:lumOff val="25000"/>
                               </a:schemeClr>
                             </a:solidFill>
-                            <a:latin typeface="+mn-lt"/>
+                            <a:latin typeface="Cambria Math" panose="02040503050406030204" pitchFamily="18" charset="0"/>
                             <a:ea typeface="ＭＳ Ｐゴシック" charset="-128"/>
                           </a:rPr>
                         </m:ctrlPr>
@@ -7160,7 +7241,7 @@
                                 <a:lumOff val="25000"/>
                               </a:schemeClr>
                             </a:solidFill>
-                            <a:latin typeface="+mn-lt"/>
+                            <a:latin typeface="Cambria Math" panose="02040503050406030204" pitchFamily="18" charset="0"/>
                             <a:ea typeface="ＭＳ Ｐゴシック" charset="-128"/>
                           </a:rPr>
                           <m:t>𝐼</m:t>
@@ -7175,7 +7256,7 @@
                                 <a:lumOff val="25000"/>
                               </a:schemeClr>
                             </a:solidFill>
-                            <a:latin typeface="+mn-lt"/>
+                            <a:latin typeface="Cambria Math" panose="02040503050406030204" pitchFamily="18" charset="0"/>
                             <a:ea typeface="ＭＳ Ｐゴシック" charset="-128"/>
                           </a:rPr>
                           <m:t>0</m:t>
@@ -7190,7 +7271,7 @@
                             <a:lumOff val="25000"/>
                           </a:schemeClr>
                         </a:solidFill>
-                        <a:latin typeface="+mn-lt"/>
+                        <a:latin typeface="Cambria Math" panose="02040503050406030204" pitchFamily="18" charset="0"/>
                         <a:ea typeface="ＭＳ Ｐゴシック" charset="-128"/>
                       </a:rPr>
                       <m:t>, </m:t>
@@ -7203,7 +7284,7 @@
                             <a:lumOff val="25000"/>
                           </a:schemeClr>
                         </a:solidFill>
-                        <a:latin typeface="+mn-lt"/>
+                        <a:latin typeface="Cambria Math" panose="02040503050406030204" pitchFamily="18" charset="0"/>
                         <a:ea typeface="ＭＳ Ｐゴシック" charset="-128"/>
                       </a:rPr>
                       <m:t>𝑛</m:t>
@@ -7236,7 +7317,7 @@
                             <a:lumOff val="25000"/>
                           </a:schemeClr>
                         </a:solidFill>
-                        <a:latin typeface="+mn-lt"/>
+                        <a:latin typeface="Cambria Math" panose="02040503050406030204" pitchFamily="18" charset="0"/>
                         <a:ea typeface="ＭＳ Ｐゴシック" charset="-128"/>
                       </a:rPr>
                       <m:t>Δ</m:t>
@@ -7249,7 +7330,7 @@
                             <a:lumOff val="25000"/>
                           </a:schemeClr>
                         </a:solidFill>
-                        <a:latin typeface="+mn-lt"/>
+                        <a:latin typeface="Cambria Math" panose="02040503050406030204" pitchFamily="18" charset="0"/>
                         <a:ea typeface="ＭＳ Ｐゴシック" charset="-128"/>
                       </a:rPr>
                       <m:t>𝜙</m:t>
@@ -7305,7 +7386,7 @@
             </p:txBody>
           </p:sp>
         </mc:Choice>
-        <mc:Fallback>
+        <mc:Fallback xmlns="">
           <p:sp>
             <p:nvSpPr>
               <p:cNvPr id="28" name="Text Box 242"/>
@@ -7520,8 +7601,8 @@
             <a:chExt cx="14401445" cy="5480859"/>
           </a:xfrm>
         </p:grpSpPr>
-        <mc:AlternateContent xmlns:mc="http://schemas.openxmlformats.org/markup-compatibility/2006">
-          <mc:Choice xmlns:a14="http://schemas.microsoft.com/office/drawing/2010/main" Requires="a14">
+        <mc:AlternateContent xmlns:mc="http://schemas.openxmlformats.org/markup-compatibility/2006" xmlns:a14="http://schemas.microsoft.com/office/drawing/2010/main">
+          <mc:Choice Requires="a14">
             <p:sp>
               <p:nvSpPr>
                 <p:cNvPr id="34" name="Text Box 242"/>
@@ -7709,7 +7790,7 @@
                               <a:lumOff val="25000"/>
                             </a:schemeClr>
                           </a:solidFill>
-                          <a:latin typeface="+mn-lt"/>
+                          <a:latin typeface="Cambria Math" panose="02040503050406030204" pitchFamily="18" charset="0"/>
                           <a:ea typeface="ＭＳ Ｐゴシック" charset="-128"/>
                         </a:rPr>
                         <m:t>Δ</m:t>
@@ -7722,7 +7803,7 @@
                               <a:lumOff val="25000"/>
                             </a:schemeClr>
                           </a:solidFill>
-                          <a:latin typeface="+mn-lt"/>
+                          <a:latin typeface="Cambria Math" panose="02040503050406030204" pitchFamily="18" charset="0"/>
                           <a:ea typeface="ＭＳ Ｐゴシック" charset="-128"/>
                         </a:rPr>
                         <m:t>𝜙</m:t>
@@ -7790,7 +7871,7 @@
               </p:txBody>
             </p:sp>
           </mc:Choice>
-          <mc:Fallback>
+          <mc:Fallback xmlns="">
             <p:sp>
               <p:nvSpPr>
                 <p:cNvPr id="34" name="Text Box 242"/>
@@ -9033,8 +9114,8 @@
           </mc:Fallback>
         </mc:AlternateContent>
       </p:grpSp>
-      <mc:AlternateContent xmlns:mc="http://schemas.openxmlformats.org/markup-compatibility/2006">
-        <mc:Choice xmlns:a14="http://schemas.microsoft.com/office/drawing/2010/main" Requires="a14">
+      <mc:AlternateContent xmlns:mc="http://schemas.openxmlformats.org/markup-compatibility/2006" xmlns:a14="http://schemas.microsoft.com/office/drawing/2010/main">
+        <mc:Choice Requires="a14">
           <p:sp>
             <p:nvSpPr>
               <p:cNvPr id="1524" name="Text Box 242">
@@ -9201,7 +9282,7 @@
                             <a:lumOff val="25000"/>
                           </a:schemeClr>
                         </a:solidFill>
-                        <a:latin typeface="+mn-lt"/>
+                        <a:latin typeface="Cambria Math" panose="02040503050406030204" pitchFamily="18" charset="0"/>
                         <a:ea typeface="ＭＳ Ｐゴシック" charset="-128"/>
                       </a:rPr>
                       <m:t>𝑛</m:t>
@@ -9214,7 +9295,7 @@
                             <a:lumOff val="25000"/>
                           </a:schemeClr>
                         </a:solidFill>
-                        <a:latin typeface="+mn-lt"/>
+                        <a:latin typeface="Cambria Math" panose="02040503050406030204" pitchFamily="18" charset="0"/>
                         <a:ea typeface="ＭＳ Ｐゴシック" charset="-128"/>
                       </a:rPr>
                       <m:t>=3</m:t>
@@ -9244,7 +9325,7 @@
                             <a:lumOff val="25000"/>
                           </a:schemeClr>
                         </a:solidFill>
-                        <a:latin typeface="+mn-lt"/>
+                        <a:latin typeface="Cambria Math" panose="02040503050406030204" pitchFamily="18" charset="0"/>
                         <a:ea typeface="ＭＳ Ｐゴシック" charset="-128"/>
                       </a:rPr>
                       <m:t>𝑛</m:t>
@@ -9274,7 +9355,7 @@
                             <a:lumOff val="25000"/>
                           </a:schemeClr>
                         </a:solidFill>
-                        <a:latin typeface="+mn-lt"/>
+                        <a:latin typeface="Cambria Math" panose="02040503050406030204" pitchFamily="18" charset="0"/>
                         <a:ea typeface="ＭＳ Ｐゴシック" charset="-128"/>
                       </a:rPr>
                       <m:t>𝑛</m:t>
@@ -9326,7 +9407,7 @@
                             <a:lumOff val="25000"/>
                           </a:schemeClr>
                         </a:solidFill>
-                        <a:latin typeface="+mn-lt"/>
+                        <a:latin typeface="Cambria Math" panose="02040503050406030204" pitchFamily="18" charset="0"/>
                         <a:ea typeface="ＭＳ Ｐゴシック" charset="-128"/>
                       </a:rPr>
                       <m:t>𝑛</m:t>
@@ -9356,7 +9437,7 @@
                             <a:lumOff val="25000"/>
                           </a:schemeClr>
                         </a:solidFill>
-                        <a:latin typeface="+mn-lt"/>
+                        <a:latin typeface="Cambria Math" panose="02040503050406030204" pitchFamily="18" charset="0"/>
                         <a:ea typeface="ＭＳ Ｐゴシック" charset="-128"/>
                       </a:rPr>
                       <m:t>𝑛</m:t>
@@ -9369,7 +9450,7 @@
                             <a:lumOff val="25000"/>
                           </a:schemeClr>
                         </a:solidFill>
-                        <a:latin typeface="+mn-lt"/>
+                        <a:latin typeface="Cambria Math" panose="02040503050406030204" pitchFamily="18" charset="0"/>
                         <a:ea typeface="ＭＳ Ｐゴシック" charset="-128"/>
                       </a:rPr>
                       <m:t>=2</m:t>
@@ -9399,7 +9480,7 @@
                             <a:lumOff val="25000"/>
                           </a:schemeClr>
                         </a:solidFill>
-                        <a:latin typeface="+mn-lt"/>
+                        <a:latin typeface="Cambria Math" panose="02040503050406030204" pitchFamily="18" charset="0"/>
                         <a:ea typeface="ＭＳ Ｐゴシック" charset="-128"/>
                       </a:rPr>
                       <m:t>𝑛</m:t>
@@ -9412,7 +9493,7 @@
                             <a:lumOff val="25000"/>
                           </a:schemeClr>
                         </a:solidFill>
-                        <a:latin typeface="+mn-lt"/>
+                        <a:latin typeface="Cambria Math" panose="02040503050406030204" pitchFamily="18" charset="0"/>
                         <a:ea typeface="ＭＳ Ｐゴシック" charset="-128"/>
                       </a:rPr>
                       <m:t>=4</m:t>
@@ -9466,7 +9547,7 @@
                                 <a:lumOff val="25000"/>
                               </a:schemeClr>
                             </a:solidFill>
-                            <a:latin typeface="+mn-lt"/>
+                            <a:latin typeface="Cambria Math" panose="02040503050406030204" pitchFamily="18" charset="0"/>
                             <a:ea typeface="ＭＳ Ｐゴシック" charset="-128"/>
                           </a:rPr>
                         </m:ctrlPr>
@@ -9480,7 +9561,7 @@
                                 <a:lumOff val="25000"/>
                               </a:schemeClr>
                             </a:solidFill>
-                            <a:latin typeface="+mn-lt"/>
+                            <a:latin typeface="Cambria Math" panose="02040503050406030204" pitchFamily="18" charset="0"/>
                             <a:ea typeface="ＭＳ Ｐゴシック" charset="-128"/>
                           </a:rPr>
                           <m:t>𝐼</m:t>
@@ -9495,7 +9576,7 @@
                                 <a:lumOff val="25000"/>
                               </a:schemeClr>
                             </a:solidFill>
-                            <a:latin typeface="+mn-lt"/>
+                            <a:latin typeface="Cambria Math" panose="02040503050406030204" pitchFamily="18" charset="0"/>
                             <a:ea typeface="ＭＳ Ｐゴシック" charset="-128"/>
                           </a:rPr>
                           <m:t>0</m:t>
@@ -9527,7 +9608,7 @@
                             <a:lumOff val="25000"/>
                           </a:schemeClr>
                         </a:solidFill>
-                        <a:latin typeface="+mn-lt"/>
+                        <a:latin typeface="Cambria Math" panose="02040503050406030204" pitchFamily="18" charset="0"/>
                         <a:ea typeface="ＭＳ Ｐゴシック" charset="-128"/>
                       </a:rPr>
                       <m:t>𝛼</m:t>
@@ -9551,7 +9632,7 @@
             </p:txBody>
           </p:sp>
         </mc:Choice>
-        <mc:Fallback>
+        <mc:Fallback xmlns="">
           <p:sp>
             <p:nvSpPr>
               <p:cNvPr id="1524" name="Text Box 242">
@@ -9600,8 +9681,8 @@
           </p:sp>
         </mc:Fallback>
       </mc:AlternateContent>
-      <mc:AlternateContent xmlns:mc="http://schemas.openxmlformats.org/markup-compatibility/2006">
-        <mc:Choice xmlns:a14="http://schemas.microsoft.com/office/drawing/2010/main" Requires="a14">
+      <mc:AlternateContent xmlns:mc="http://schemas.openxmlformats.org/markup-compatibility/2006" xmlns:a14="http://schemas.microsoft.com/office/drawing/2010/main">
+        <mc:Choice Requires="a14">
           <p:sp>
             <p:nvSpPr>
               <p:cNvPr id="1527" name="Text Box 242">
@@ -9768,7 +9849,7 @@
                             <a:lumOff val="25000"/>
                           </a:schemeClr>
                         </a:solidFill>
-                        <a:latin typeface="+mn-lt"/>
+                        <a:latin typeface="Cambria Math" panose="02040503050406030204" pitchFamily="18" charset="0"/>
                         <a:ea typeface="ＭＳ Ｐゴシック" charset="-128"/>
                       </a:rPr>
                       <m:t>𝑛</m:t>
@@ -9781,7 +9862,7 @@
                             <a:lumOff val="25000"/>
                           </a:schemeClr>
                         </a:solidFill>
-                        <a:latin typeface="+mn-lt"/>
+                        <a:latin typeface="Cambria Math" panose="02040503050406030204" pitchFamily="18" charset="0"/>
                         <a:ea typeface="ＭＳ Ｐゴシック" charset="-128"/>
                       </a:rPr>
                       <m:t>=2</m:t>
@@ -9813,7 +9894,7 @@
                                 <a:lumOff val="25000"/>
                               </a:schemeClr>
                             </a:solidFill>
-                            <a:latin typeface="+mn-lt"/>
+                            <a:latin typeface="Cambria Math" panose="02040503050406030204" pitchFamily="18" charset="0"/>
                             <a:ea typeface="ＭＳ Ｐゴシック" charset="-128"/>
                           </a:rPr>
                         </m:ctrlPr>
@@ -9827,7 +9908,7 @@
                                 <a:lumOff val="25000"/>
                               </a:schemeClr>
                             </a:solidFill>
-                            <a:latin typeface="+mn-lt"/>
+                            <a:latin typeface="Cambria Math" panose="02040503050406030204" pitchFamily="18" charset="0"/>
                             <a:ea typeface="ＭＳ Ｐゴシック" charset="-128"/>
                           </a:rPr>
                           <m:t>𝐼</m:t>
@@ -9842,7 +9923,7 @@
                                 <a:lumOff val="25000"/>
                               </a:schemeClr>
                             </a:solidFill>
-                            <a:latin typeface="+mn-lt"/>
+                            <a:latin typeface="Cambria Math" panose="02040503050406030204" pitchFamily="18" charset="0"/>
                             <a:ea typeface="ＭＳ Ｐゴシック" charset="-128"/>
                           </a:rPr>
                           <m:t>0 </m:t>
@@ -9857,7 +9938,7 @@
                             <a:lumOff val="25000"/>
                           </a:schemeClr>
                         </a:solidFill>
-                        <a:latin typeface="+mn-lt"/>
+                        <a:latin typeface="Cambria Math" panose="02040503050406030204" pitchFamily="18" charset="0"/>
                         <a:ea typeface="ＭＳ Ｐゴシック" charset="-128"/>
                       </a:rPr>
                       <m:t>=50</m:t>
@@ -9913,7 +9994,7 @@
                             <a:lumOff val="25000"/>
                           </a:schemeClr>
                         </a:solidFill>
-                        <a:latin typeface="+mn-lt"/>
+                        <a:latin typeface="Cambria Math" panose="02040503050406030204" pitchFamily="18" charset="0"/>
                         <a:ea typeface="ＭＳ Ｐゴシック" charset="-128"/>
                       </a:rPr>
                       <m:t>𝑛</m:t>
@@ -9926,7 +10007,7 @@
                             <a:lumOff val="25000"/>
                           </a:schemeClr>
                         </a:solidFill>
-                        <a:latin typeface="+mn-lt"/>
+                        <a:latin typeface="Cambria Math" panose="02040503050406030204" pitchFamily="18" charset="0"/>
                         <a:ea typeface="ＭＳ Ｐゴシック" charset="-128"/>
                       </a:rPr>
                       <m:t>=3</m:t>
@@ -9958,7 +10039,7 @@
                                 <a:lumOff val="25000"/>
                               </a:schemeClr>
                             </a:solidFill>
-                            <a:latin typeface="+mn-lt"/>
+                            <a:latin typeface="Cambria Math" panose="02040503050406030204" pitchFamily="18" charset="0"/>
                             <a:ea typeface="ＭＳ Ｐゴシック" charset="-128"/>
                           </a:rPr>
                         </m:ctrlPr>
@@ -9972,7 +10053,7 @@
                                 <a:lumOff val="25000"/>
                               </a:schemeClr>
                             </a:solidFill>
-                            <a:latin typeface="+mn-lt"/>
+                            <a:latin typeface="Cambria Math" panose="02040503050406030204" pitchFamily="18" charset="0"/>
                             <a:ea typeface="ＭＳ Ｐゴシック" charset="-128"/>
                           </a:rPr>
                           <m:t>𝐼</m:t>
@@ -9987,7 +10068,7 @@
                                 <a:lumOff val="25000"/>
                               </a:schemeClr>
                             </a:solidFill>
-                            <a:latin typeface="+mn-lt"/>
+                            <a:latin typeface="Cambria Math" panose="02040503050406030204" pitchFamily="18" charset="0"/>
                             <a:ea typeface="ＭＳ Ｐゴシック" charset="-128"/>
                           </a:rPr>
                           <m:t>0</m:t>
@@ -10045,7 +10126,7 @@
                             <a:lumOff val="25000"/>
                           </a:schemeClr>
                         </a:solidFill>
-                        <a:latin typeface="+mn-lt"/>
+                        <a:latin typeface="Cambria Math" panose="02040503050406030204" pitchFamily="18" charset="0"/>
                         <a:ea typeface="ＭＳ Ｐゴシック" charset="-128"/>
                       </a:rPr>
                       <m:t>𝑛</m:t>
@@ -10058,7 +10139,7 @@
                             <a:lumOff val="25000"/>
                           </a:schemeClr>
                         </a:solidFill>
-                        <a:latin typeface="+mn-lt"/>
+                        <a:latin typeface="Cambria Math" panose="02040503050406030204" pitchFamily="18" charset="0"/>
                         <a:ea typeface="ＭＳ Ｐゴシック" charset="-128"/>
                       </a:rPr>
                       <m:t>=4</m:t>
@@ -10140,7 +10221,7 @@
             </p:txBody>
           </p:sp>
         </mc:Choice>
-        <mc:Fallback>
+        <mc:Fallback xmlns="">
           <p:sp>
             <p:nvSpPr>
               <p:cNvPr id="1527" name="Text Box 242">
@@ -10189,6 +10270,53 @@
           </p:sp>
         </mc:Fallback>
       </mc:AlternateContent>
+      <p:pic>
+        <p:nvPicPr>
+          <p:cNvPr id="10" name="Picture 4">
+            <a:extLst>
+              <a:ext uri="{FF2B5EF4-FFF2-40B4-BE49-F238E27FC236}">
+                <a16:creationId xmlns:a16="http://schemas.microsoft.com/office/drawing/2014/main" id="{799C8AE4-D3D3-D8F6-07CE-571BA578C9E9}"/>
+              </a:ext>
+            </a:extLst>
+          </p:cNvPr>
+          <p:cNvPicPr>
+            <a:picLocks noChangeAspect="1" noChangeArrowheads="1"/>
+          </p:cNvPicPr>
+          <p:nvPr/>
+        </p:nvPicPr>
+        <p:blipFill>
+          <a:blip r:embed="rId16">
+            <a:extLst>
+              <a:ext uri="{28A0092B-C50C-407E-A947-70E740481C1C}">
+                <a14:useLocalDpi xmlns:a14="http://schemas.microsoft.com/office/drawing/2010/main" val="0"/>
+              </a:ext>
+            </a:extLst>
+          </a:blip>
+          <a:srcRect/>
+          <a:stretch>
+            <a:fillRect/>
+          </a:stretch>
+        </p:blipFill>
+        <p:spPr bwMode="auto">
+          <a:xfrm>
+            <a:off x="25908001" y="809770"/>
+            <a:ext cx="4150644" cy="4142614"/>
+          </a:xfrm>
+          <a:prstGeom prst="rect">
+            <a:avLst/>
+          </a:prstGeom>
+          <a:noFill/>
+          <a:extLst>
+            <a:ext uri="{909E8E84-426E-40DD-AFC4-6F175D3DCCD1}">
+              <a14:hiddenFill xmlns:a14="http://schemas.microsoft.com/office/drawing/2010/main">
+                <a:solidFill>
+                  <a:srgbClr val="FFFFFF"/>
+                </a:solidFill>
+              </a14:hiddenFill>
+            </a:ext>
+          </a:extLst>
+        </p:spPr>
+      </p:pic>
     </p:spTree>
     <p:extLst>
       <p:ext uri="{BB962C8B-B14F-4D97-AF65-F5344CB8AC3E}">
@@ -14628,14 +14756,6 @@
 </file>
 
 <file path=customXml/item1.xml><?xml version="1.0" encoding="utf-8"?>
-<p:properties xmlns:p="http://schemas.microsoft.com/office/2006/metadata/properties" xmlns:xsi="http://www.w3.org/2001/XMLSchema-instance" xmlns:pc="http://schemas.microsoft.com/office/infopath/2007/PartnerControls">
-  <documentManagement>
-    <_activity xmlns="841e8680-4293-4076-bfcf-f9a2b2231bdd" xsi:nil="true"/>
-  </documentManagement>
-</p:properties>
-</file>
-
-<file path=customXml/item2.xml><?xml version="1.0" encoding="utf-8"?>
 <ct:contentTypeSchema xmlns:ct="http://schemas.microsoft.com/office/2006/metadata/contentType" xmlns:ma="http://schemas.microsoft.com/office/2006/metadata/properties/metaAttributes" ct:_="" ma:_="" ma:contentTypeName="Document" ma:contentTypeID="0x010100D8558321CBD14A40ADC97F4E1EC88580" ma:contentTypeVersion="16" ma:contentTypeDescription="Create a new document." ma:contentTypeScope="" ma:versionID="7f10ada2703ab5a87e36b2d3130c569b">
   <xsd:schema xmlns:xsd="http://www.w3.org/2001/XMLSchema" xmlns:xs="http://www.w3.org/2001/XMLSchema" xmlns:p="http://schemas.microsoft.com/office/2006/metadata/properties" xmlns:ns3="e1e2823e-0627-4f7b-8512-977cf2b75da5" xmlns:ns4="841e8680-4293-4076-bfcf-f9a2b2231bdd" targetNamespace="http://schemas.microsoft.com/office/2006/metadata/properties" ma:root="true" ma:fieldsID="88152dd14bd4b30630478ce455527e6b" ns3:_="" ns4:_="">
     <xsd:import namespace="e1e2823e-0627-4f7b-8512-977cf2b75da5"/>
@@ -14876,6 +14996,14 @@
 </ct:contentTypeSchema>
 </file>
 
+<file path=customXml/item2.xml><?xml version="1.0" encoding="utf-8"?>
+<p:properties xmlns:p="http://schemas.microsoft.com/office/2006/metadata/properties" xmlns:xsi="http://www.w3.org/2001/XMLSchema-instance" xmlns:pc="http://schemas.microsoft.com/office/infopath/2007/PartnerControls">
+  <documentManagement>
+    <_activity xmlns="841e8680-4293-4076-bfcf-f9a2b2231bdd" xsi:nil="true"/>
+  </documentManagement>
+</p:properties>
+</file>
+
 <file path=customXml/item3.xml><?xml version="1.0" encoding="utf-8"?>
 <?mso-contentType ?>
 <FormTemplates xmlns="http://schemas.microsoft.com/sharepoint/v3/contenttype/forms">
@@ -14886,23 +15014,6 @@
 </file>
 
 <file path=customXml/itemProps1.xml><?xml version="1.0" encoding="utf-8"?>
-<ds:datastoreItem xmlns:ds="http://schemas.openxmlformats.org/officeDocument/2006/customXml" ds:itemID="{C3FEF923-5265-4CF9-82A3-3E5F50E7A64D}">
-  <ds:schemaRefs>
-    <ds:schemaRef ds:uri="e1e2823e-0627-4f7b-8512-977cf2b75da5"/>
-    <ds:schemaRef ds:uri="http://www.w3.org/XML/1998/namespace"/>
-    <ds:schemaRef ds:uri="http://schemas.openxmlformats.org/package/2006/metadata/core-properties"/>
-    <ds:schemaRef ds:uri="http://purl.org/dc/dcmitype/"/>
-    <ds:schemaRef ds:uri="http://schemas.microsoft.com/office/2006/documentManagement/types"/>
-    <ds:schemaRef ds:uri="http://schemas.microsoft.com/office/2006/metadata/properties"/>
-    <ds:schemaRef ds:uri="841e8680-4293-4076-bfcf-f9a2b2231bdd"/>
-    <ds:schemaRef ds:uri="http://purl.org/dc/terms/"/>
-    <ds:schemaRef ds:uri="http://schemas.microsoft.com/office/infopath/2007/PartnerControls"/>
-    <ds:schemaRef ds:uri="http://purl.org/dc/elements/1.1/"/>
-  </ds:schemaRefs>
-</ds:datastoreItem>
-</file>
-
-<file path=customXml/itemProps2.xml><?xml version="1.0" encoding="utf-8"?>
 <ds:datastoreItem xmlns:ds="http://schemas.openxmlformats.org/officeDocument/2006/customXml" ds:itemID="{DF826009-A018-4ABA-BD27-B3B4148E8553}">
   <ds:schemaRefs>
     <ds:schemaRef ds:uri="http://schemas.microsoft.com/office/2006/metadata/contentType"/>
@@ -14921,6 +15032,23 @@
 </ds:datastoreItem>
 </file>
 
+<file path=customXml/itemProps2.xml><?xml version="1.0" encoding="utf-8"?>
+<ds:datastoreItem xmlns:ds="http://schemas.openxmlformats.org/officeDocument/2006/customXml" ds:itemID="{C3FEF923-5265-4CF9-82A3-3E5F50E7A64D}">
+  <ds:schemaRefs>
+    <ds:schemaRef ds:uri="e1e2823e-0627-4f7b-8512-977cf2b75da5"/>
+    <ds:schemaRef ds:uri="http://www.w3.org/XML/1998/namespace"/>
+    <ds:schemaRef ds:uri="http://schemas.openxmlformats.org/package/2006/metadata/core-properties"/>
+    <ds:schemaRef ds:uri="http://purl.org/dc/dcmitype/"/>
+    <ds:schemaRef ds:uri="http://schemas.microsoft.com/office/2006/documentManagement/types"/>
+    <ds:schemaRef ds:uri="http://schemas.microsoft.com/office/2006/metadata/properties"/>
+    <ds:schemaRef ds:uri="841e8680-4293-4076-bfcf-f9a2b2231bdd"/>
+    <ds:schemaRef ds:uri="http://purl.org/dc/terms/"/>
+    <ds:schemaRef ds:uri="http://schemas.microsoft.com/office/infopath/2007/PartnerControls"/>
+    <ds:schemaRef ds:uri="http://purl.org/dc/elements/1.1/"/>
+  </ds:schemaRefs>
+</ds:datastoreItem>
+</file>
+
 <file path=customXml/itemProps3.xml><?xml version="1.0" encoding="utf-8"?>
 <ds:datastoreItem xmlns:ds="http://schemas.openxmlformats.org/officeDocument/2006/customXml" ds:itemID="{76DA871C-37EA-4583-ADDD-341591657930}">
   <ds:schemaRefs>

</xml_diff>